<commit_message>
2023.3 update of sync files
</commit_message>
<xml_diff>
--- a/docs/presentations/Sage300TechnicalSessionAfterTheBasics.pptx
+++ b/docs/presentations/Sage300TechnicalSessionAfterTheBasics.pptx
@@ -282,7 +282,7 @@
           <a:p>
             <a:fld id="{EC0ECC91-7099-9546-9775-79C77D0DA930}" type="datetimeFigureOut">
               <a:rPr lang="en-US" smtClean="0"/>
-              <a:t>4/14/2023</a:t>
+              <a:t>5/30/2023</a:t>
             </a:fld>
             <a:endParaRPr lang="en-US"/>
           </a:p>
@@ -8015,8 +8015,12 @@
           </a:p>
           <a:p>
             <a:r>
+              <a:rPr lang="en-US"/>
+              <a:t>June </a:t>
+            </a:r>
+            <a:r>
               <a:rPr lang="en-US" dirty="0"/>
-              <a:t>April 2023</a:t>
+              <a:t>2023</a:t>
             </a:r>
           </a:p>
         </p:txBody>

</xml_diff>

<commit_message>
Rev presentations for 2024.2
</commit_message>
<xml_diff>
--- a/docs/presentations/Sage300TechnicalSessionAfterTheBasics.pptx
+++ b/docs/presentations/Sage300TechnicalSessionAfterTheBasics.pptx
@@ -20,20 +20,20 @@
     <p:sldId id="494" r:id="rId11"/>
     <p:sldId id="2140754137" r:id="rId12"/>
     <p:sldId id="2140754138" r:id="rId13"/>
-    <p:sldId id="271" r:id="rId14"/>
-    <p:sldId id="2140754143" r:id="rId15"/>
-    <p:sldId id="2140754162" r:id="rId16"/>
-    <p:sldId id="2140754136" r:id="rId17"/>
-    <p:sldId id="2140754139" r:id="rId18"/>
-    <p:sldId id="2140754140" r:id="rId19"/>
-    <p:sldId id="2140754141" r:id="rId20"/>
-    <p:sldId id="2140754142" r:id="rId21"/>
-    <p:sldId id="2140754144" r:id="rId22"/>
-    <p:sldId id="2140754145" r:id="rId23"/>
-    <p:sldId id="2140754146" r:id="rId24"/>
-    <p:sldId id="2140754149" r:id="rId25"/>
-    <p:sldId id="2140754150" r:id="rId26"/>
-    <p:sldId id="2140754148" r:id="rId27"/>
+    <p:sldId id="2140754143" r:id="rId14"/>
+    <p:sldId id="2140754164" r:id="rId15"/>
+    <p:sldId id="271" r:id="rId16"/>
+    <p:sldId id="2140754162" r:id="rId17"/>
+    <p:sldId id="2140754136" r:id="rId18"/>
+    <p:sldId id="2140754139" r:id="rId19"/>
+    <p:sldId id="2140754140" r:id="rId20"/>
+    <p:sldId id="2140754141" r:id="rId21"/>
+    <p:sldId id="2140754142" r:id="rId22"/>
+    <p:sldId id="2140754144" r:id="rId23"/>
+    <p:sldId id="2140754145" r:id="rId24"/>
+    <p:sldId id="2140754146" r:id="rId25"/>
+    <p:sldId id="2140754149" r:id="rId26"/>
+    <p:sldId id="2140754150" r:id="rId27"/>
     <p:sldId id="2140754151" r:id="rId28"/>
     <p:sldId id="2140754152" r:id="rId29"/>
     <p:sldId id="2140754147" r:id="rId30"/>
@@ -282,7 +282,7 @@
           <a:p>
             <a:fld id="{EC0ECC91-7099-9546-9775-79C77D0DA930}" type="datetimeFigureOut">
               <a:rPr lang="en-US" smtClean="0"/>
-              <a:t>5/30/2023</a:t>
+              <a:t>2/14/2024</a:t>
             </a:fld>
             <a:endParaRPr lang="en-US"/>
           </a:p>
@@ -6034,7 +6034,7 @@
                 <a:cs typeface="Sage Text" panose="02010503040201060103" pitchFamily="50" charset="0"/>
                 <a:sym typeface="Sage Text" panose="02010503040201060103" pitchFamily="50" charset="0"/>
               </a:rPr>
-              <a:t>© 2023 The Sage Group plc, or its licensors. All rights reserved.</a:t>
+              <a:t>© 2024 The Sage Group plc, or its licensors. All rights reserved.</a:t>
             </a:r>
           </a:p>
         </p:txBody>
@@ -6357,7 +6357,7 @@
                 <a:cs typeface="Sage Text" panose="02010503040201060103" pitchFamily="50" charset="0"/>
                 <a:sym typeface="Sage Text" panose="02010503040201060103" pitchFamily="50" charset="0"/>
               </a:rPr>
-              <a:t>© 2023 The Sage Group plc, or its licensors. All rights reserved.</a:t>
+              <a:t>© 2024 The Sage Group plc, or its licensors. All rights reserved.</a:t>
             </a:r>
           </a:p>
         </p:txBody>
@@ -6783,7 +6783,7 @@
                 </a:solidFill>
                 <a:latin typeface="Sage Text" panose="02010503040201060103" pitchFamily="2" charset="77"/>
               </a:rPr>
-              <a:t>© 2023 The Sage Group plc or its licensors. All rights reserved. Sage, Sage logos, and Sage product and service names mentioned herein are the trademarks of Sage Global Services Limited or its licensors. All other trademarks are the property of their respective owners.</a:t>
+              <a:t>© 2024 The Sage Group plc or its licensors. All rights reserved. Sage, Sage logos, and Sage product and service names mentioned herein are the trademarks of Sage Global Services Limited or its licensors. All other trademarks are the property of their respective owners.</a:t>
             </a:r>
           </a:p>
         </p:txBody>
@@ -7078,7 +7078,7 @@
                 <a:cs typeface="Sage Text" panose="02010503040201060103" pitchFamily="50" charset="0"/>
                 <a:sym typeface="Sage Text" panose="02010503040201060103" pitchFamily="50" charset="0"/>
               </a:rPr>
-              <a:t>© 2023 The Sage Group plc, or its licensors. All rights reserved.</a:t>
+              <a:t>© 2024 The Sage Group plc, or its licensors. All rights reserved.</a:t>
             </a:r>
           </a:p>
         </p:txBody>
@@ -7543,7 +7543,7 @@
                 <a:cs typeface="Sage Text" panose="02010503040201060103" pitchFamily="50" charset="0"/>
                 <a:sym typeface="Sage Text" panose="02010503040201060103" pitchFamily="50" charset="0"/>
               </a:rPr>
-              <a:t>© 2023 The Sage Group plc, or its licensors. All rights reserved.</a:t>
+              <a:t>© 2024 The Sage Group plc, or its licensors. All rights reserved.</a:t>
             </a:r>
           </a:p>
         </p:txBody>
@@ -8015,12 +8015,8 @@
           </a:p>
           <a:p>
             <a:r>
-              <a:rPr lang="en-US"/>
-              <a:t>June </a:t>
-            </a:r>
-            <a:r>
               <a:rPr lang="en-US" dirty="0"/>
-              <a:t>2023</a:t>
+              <a:t>February 2024</a:t>
             </a:r>
           </a:p>
         </p:txBody>
@@ -8047,6 +8043,13 @@
             <a:ext cx="7720215" cy="6858008"/>
           </a:xfrm>
         </p:spPr>
+        <p:txBody>
+          <a:bodyPr/>
+          <a:lstStyle/>
+          <a:p>
+            <a:endParaRPr lang="en-US"/>
+          </a:p>
+        </p:txBody>
       </p:sp>
       <p:pic>
         <p:nvPicPr>
@@ -10735,7 +10738,7 @@
           <p:cNvPr id="4" name="Title 3">
             <a:extLst>
               <a:ext uri="{FF2B5EF4-FFF2-40B4-BE49-F238E27FC236}">
-                <a16:creationId xmlns:a16="http://schemas.microsoft.com/office/drawing/2014/main" id="{3926F967-C1B1-2E43-8EFA-7467B6AD7017}"/>
+                <a16:creationId xmlns:a16="http://schemas.microsoft.com/office/drawing/2014/main" id="{AA89E543-146D-294F-9FD3-AF6A4DE2627F}"/>
               </a:ext>
             </a:extLst>
           </p:cNvPr>
@@ -10760,308 +10763,6 @@
       </p:sp>
       <p:sp>
         <p:nvSpPr>
-          <p:cNvPr id="2" name="Slide Number Placeholder 1">
-            <a:extLst>
-              <a:ext uri="{FF2B5EF4-FFF2-40B4-BE49-F238E27FC236}">
-                <a16:creationId xmlns:a16="http://schemas.microsoft.com/office/drawing/2014/main" id="{32B9BF9A-1DC4-4A40-B990-C2C3F5814935}"/>
-              </a:ext>
-            </a:extLst>
-          </p:cNvPr>
-          <p:cNvSpPr>
-            <a:spLocks noGrp="1"/>
-          </p:cNvSpPr>
-          <p:nvPr>
-            <p:ph type="sldNum" sz="quarter" idx="4294967295"/>
-          </p:nvPr>
-        </p:nvSpPr>
-        <p:spPr>
-          <a:xfrm>
-            <a:off x="11595100" y="6370638"/>
-            <a:ext cx="596900" cy="365125"/>
-          </a:xfrm>
-        </p:spPr>
-        <p:txBody>
-          <a:bodyPr/>
-          <a:lstStyle/>
-          <a:p>
-            <a:r>
-              <a:rPr lang="en-US">
-                <a:latin typeface="Sage Text Light" panose="02010303040201060103" pitchFamily="2" charset="77"/>
-              </a:rPr>
-              <a:t>Page </a:t>
-            </a:r>
-            <a:fld id="{C801F209-6BE7-4AF7-9211-E3F7558EC97C}" type="slidenum">
-              <a:rPr smtClean="0">
-                <a:latin typeface="Sage Text Light" panose="02010303040201060103" pitchFamily="2" charset="77"/>
-              </a:rPr>
-              <a:pPr/>
-              <a:t>13</a:t>
-            </a:fld>
-            <a:endParaRPr dirty="0">
-              <a:latin typeface="Sage Text Light" panose="02010303040201060103" pitchFamily="2" charset="77"/>
-            </a:endParaRPr>
-          </a:p>
-        </p:txBody>
-      </p:sp>
-      <p:sp>
-        <p:nvSpPr>
-          <p:cNvPr id="3" name="Subtitle 2">
-            <a:extLst>
-              <a:ext uri="{FF2B5EF4-FFF2-40B4-BE49-F238E27FC236}">
-                <a16:creationId xmlns:a16="http://schemas.microsoft.com/office/drawing/2014/main" id="{EA515567-C881-9DDA-4B64-977C04BE7326}"/>
-              </a:ext>
-            </a:extLst>
-          </p:cNvPr>
-          <p:cNvSpPr txBox="1">
-            <a:spLocks/>
-          </p:cNvSpPr>
-          <p:nvPr/>
-        </p:nvSpPr>
-        <p:spPr>
-          <a:xfrm>
-            <a:off x="420623" y="1024338"/>
-            <a:ext cx="3820450" cy="1243584"/>
-          </a:xfrm>
-          <a:prstGeom prst="rect">
-            <a:avLst/>
-          </a:prstGeom>
-        </p:spPr>
-        <p:txBody>
-          <a:bodyPr vert="horz" lIns="0" tIns="45720" rIns="0" bIns="0" rtlCol="0">
-            <a:noAutofit/>
-          </a:bodyPr>
-          <a:lstStyle>
-            <a:lvl1pPr marL="0" indent="0" algn="l" defTabSz="914400" rtl="0" eaLnBrk="1" latinLnBrk="0" hangingPunct="1">
-              <a:lnSpc>
-                <a:spcPct val="100000"/>
-              </a:lnSpc>
-              <a:spcBef>
-                <a:spcPts val="1000"/>
-              </a:spcBef>
-              <a:buFont typeface="Sage Text" panose="02010503040201060103" pitchFamily="50" charset="0"/>
-              <a:buNone/>
-              <a:defRPr lang="en-US" sz="1600" b="1" i="0" kern="1200">
-                <a:solidFill>
-                  <a:schemeClr val="tx2"/>
-                </a:solidFill>
-                <a:latin typeface="Sage Text" panose="02010503040201060103" pitchFamily="2" charset="77"/>
-                <a:ea typeface="+mn-ea"/>
-                <a:cs typeface="+mn-cs"/>
-              </a:defRPr>
-            </a:lvl1pPr>
-            <a:lvl2pPr marL="457200" indent="0" algn="ctr" defTabSz="914400" rtl="0" eaLnBrk="1" latinLnBrk="0" hangingPunct="1">
-              <a:lnSpc>
-                <a:spcPct val="100000"/>
-              </a:lnSpc>
-              <a:spcBef>
-                <a:spcPts val="500"/>
-              </a:spcBef>
-              <a:buFont typeface="Sage Text" panose="02010503040201060103" pitchFamily="50" charset="0"/>
-              <a:buNone/>
-              <a:defRPr lang="en-US" sz="2000" b="0" i="0" kern="1200">
-                <a:solidFill>
-                  <a:schemeClr val="bg1"/>
-                </a:solidFill>
-                <a:latin typeface="Sage Text" panose="02010503040201060103" pitchFamily="2" charset="77"/>
-                <a:ea typeface="+mn-ea"/>
-                <a:cs typeface="+mn-cs"/>
-              </a:defRPr>
-            </a:lvl2pPr>
-            <a:lvl3pPr marL="914400" indent="0" algn="ctr" defTabSz="914400" rtl="0" eaLnBrk="1" latinLnBrk="0" hangingPunct="1">
-              <a:lnSpc>
-                <a:spcPct val="100000"/>
-              </a:lnSpc>
-              <a:spcBef>
-                <a:spcPts val="500"/>
-              </a:spcBef>
-              <a:buFont typeface="Sage Text" panose="02010503040201060103" pitchFamily="50" charset="0"/>
-              <a:buNone/>
-              <a:defRPr lang="en-US" sz="1800" b="0" i="0" kern="1200">
-                <a:solidFill>
-                  <a:schemeClr val="bg1"/>
-                </a:solidFill>
-                <a:latin typeface="Sage Text" panose="02010503040201060103" pitchFamily="2" charset="77"/>
-                <a:ea typeface="+mn-ea"/>
-                <a:cs typeface="+mn-cs"/>
-              </a:defRPr>
-            </a:lvl3pPr>
-            <a:lvl4pPr marL="1371600" indent="0" algn="ctr" defTabSz="914400" rtl="0" eaLnBrk="1" latinLnBrk="0" hangingPunct="1">
-              <a:lnSpc>
-                <a:spcPct val="100000"/>
-              </a:lnSpc>
-              <a:spcBef>
-                <a:spcPts val="500"/>
-              </a:spcBef>
-              <a:buFont typeface="Sage Text" panose="02010503040201060103" pitchFamily="50" charset="0"/>
-              <a:buNone/>
-              <a:defRPr lang="en-US" sz="1600" b="0" i="0" kern="1200">
-                <a:solidFill>
-                  <a:schemeClr val="bg1"/>
-                </a:solidFill>
-                <a:latin typeface="Sage Text" panose="02010503040201060103" pitchFamily="2" charset="77"/>
-                <a:ea typeface="+mn-ea"/>
-                <a:cs typeface="+mn-cs"/>
-              </a:defRPr>
-            </a:lvl4pPr>
-            <a:lvl5pPr marL="1828800" indent="0" algn="ctr" defTabSz="914400" rtl="0" eaLnBrk="1" latinLnBrk="0" hangingPunct="1">
-              <a:lnSpc>
-                <a:spcPct val="100000"/>
-              </a:lnSpc>
-              <a:spcBef>
-                <a:spcPts val="500"/>
-              </a:spcBef>
-              <a:buFont typeface="Sage Text" panose="02010503040201060103" pitchFamily="50" charset="0"/>
-              <a:buNone/>
-              <a:defRPr lang="en-US" sz="1600" b="0" i="0" kern="1200">
-                <a:solidFill>
-                  <a:schemeClr val="bg1"/>
-                </a:solidFill>
-                <a:latin typeface="Sage Text" panose="02010503040201060103" pitchFamily="2" charset="77"/>
-                <a:ea typeface="+mn-ea"/>
-                <a:cs typeface="+mn-cs"/>
-              </a:defRPr>
-            </a:lvl5pPr>
-            <a:lvl6pPr marL="2286000" indent="0" algn="ctr" defTabSz="914400" rtl="0" eaLnBrk="1" latinLnBrk="0" hangingPunct="1">
-              <a:lnSpc>
-                <a:spcPct val="90000"/>
-              </a:lnSpc>
-              <a:spcBef>
-                <a:spcPts val="500"/>
-              </a:spcBef>
-              <a:buFont typeface="Sage Text" panose="02010503040201060103" pitchFamily="50" charset="0"/>
-              <a:buNone/>
-              <a:defRPr sz="1600" kern="1200">
-                <a:solidFill>
-                  <a:schemeClr val="tx1"/>
-                </a:solidFill>
-                <a:latin typeface="+mn-lt"/>
-                <a:ea typeface="+mn-ea"/>
-                <a:cs typeface="+mn-cs"/>
-              </a:defRPr>
-            </a:lvl6pPr>
-            <a:lvl7pPr marL="2743200" indent="0" algn="ctr" defTabSz="914400" rtl="0" eaLnBrk="1" latinLnBrk="0" hangingPunct="1">
-              <a:lnSpc>
-                <a:spcPct val="90000"/>
-              </a:lnSpc>
-              <a:spcBef>
-                <a:spcPts val="500"/>
-              </a:spcBef>
-              <a:buFont typeface="Sage Text" panose="02010503040201060103" pitchFamily="50" charset="0"/>
-              <a:buNone/>
-              <a:defRPr sz="1600" kern="1200">
-                <a:solidFill>
-                  <a:schemeClr val="tx1"/>
-                </a:solidFill>
-                <a:latin typeface="+mn-lt"/>
-                <a:ea typeface="+mn-ea"/>
-                <a:cs typeface="+mn-cs"/>
-              </a:defRPr>
-            </a:lvl7pPr>
-            <a:lvl8pPr marL="3200400" indent="0" algn="ctr" defTabSz="914400" rtl="0" eaLnBrk="1" latinLnBrk="0" hangingPunct="1">
-              <a:lnSpc>
-                <a:spcPct val="90000"/>
-              </a:lnSpc>
-              <a:spcBef>
-                <a:spcPts val="500"/>
-              </a:spcBef>
-              <a:buFont typeface="Sage Text" panose="02010503040201060103" pitchFamily="50" charset="0"/>
-              <a:buNone/>
-              <a:defRPr sz="1600" kern="1200">
-                <a:solidFill>
-                  <a:schemeClr val="tx1"/>
-                </a:solidFill>
-                <a:latin typeface="+mn-lt"/>
-                <a:ea typeface="+mn-ea"/>
-                <a:cs typeface="+mn-cs"/>
-              </a:defRPr>
-            </a:lvl8pPr>
-            <a:lvl9pPr marL="3657600" indent="0" algn="ctr" defTabSz="914400" rtl="0" eaLnBrk="1" latinLnBrk="0" hangingPunct="1">
-              <a:lnSpc>
-                <a:spcPct val="90000"/>
-              </a:lnSpc>
-              <a:spcBef>
-                <a:spcPts val="500"/>
-              </a:spcBef>
-              <a:buFont typeface="Sage Text" panose="02010503040201060103" pitchFamily="50" charset="0"/>
-              <a:buNone/>
-              <a:defRPr sz="1600" kern="1200">
-                <a:solidFill>
-                  <a:schemeClr val="tx1"/>
-                </a:solidFill>
-                <a:latin typeface="+mn-lt"/>
-                <a:ea typeface="+mn-ea"/>
-                <a:cs typeface="+mn-cs"/>
-              </a:defRPr>
-            </a:lvl9pPr>
-          </a:lstStyle>
-          <a:p>
-            <a:r>
-              <a:rPr lang="en-US" sz="2400" b="0" dirty="0"/>
-              <a:t>Overview</a:t>
-            </a:r>
-          </a:p>
-        </p:txBody>
-      </p:sp>
-    </p:spTree>
-    <p:extLst>
-      <p:ext uri="{BB962C8B-B14F-4D97-AF65-F5344CB8AC3E}">
-        <p14:creationId xmlns:p14="http://schemas.microsoft.com/office/powerpoint/2010/main" val="3023662932"/>
-      </p:ext>
-    </p:extLst>
-  </p:cSld>
-  <p:clrMapOvr>
-    <a:masterClrMapping/>
-  </p:clrMapOvr>
-</p:sld>
-</file>
-
-<file path=ppt/slides/slide14.xml><?xml version="1.0" encoding="utf-8"?>
-<p:sld xmlns:a="http://schemas.openxmlformats.org/drawingml/2006/main" xmlns:r="http://schemas.openxmlformats.org/officeDocument/2006/relationships" xmlns:p="http://schemas.openxmlformats.org/presentationml/2006/main">
-  <p:cSld>
-    <p:spTree>
-      <p:nvGrpSpPr>
-        <p:cNvPr id="1" name=""/>
-        <p:cNvGrpSpPr/>
-        <p:nvPr/>
-      </p:nvGrpSpPr>
-      <p:grpSpPr>
-        <a:xfrm>
-          <a:off x="0" y="0"/>
-          <a:ext cx="0" cy="0"/>
-          <a:chOff x="0" y="0"/>
-          <a:chExt cx="0" cy="0"/>
-        </a:xfrm>
-      </p:grpSpPr>
-      <p:sp>
-        <p:nvSpPr>
-          <p:cNvPr id="4" name="Title 3">
-            <a:extLst>
-              <a:ext uri="{FF2B5EF4-FFF2-40B4-BE49-F238E27FC236}">
-                <a16:creationId xmlns:a16="http://schemas.microsoft.com/office/drawing/2014/main" id="{AA89E543-146D-294F-9FD3-AF6A4DE2627F}"/>
-              </a:ext>
-            </a:extLst>
-          </p:cNvPr>
-          <p:cNvSpPr>
-            <a:spLocks noGrp="1"/>
-          </p:cNvSpPr>
-          <p:nvPr>
-            <p:ph type="title"/>
-          </p:nvPr>
-        </p:nvSpPr>
-        <p:spPr/>
-        <p:txBody>
-          <a:bodyPr/>
-          <a:lstStyle/>
-          <a:p>
-            <a:r>
-              <a:rPr lang="en-US" dirty="0"/>
-              <a:t>Upcoming Items</a:t>
-            </a:r>
-          </a:p>
-        </p:txBody>
-      </p:sp>
-      <p:sp>
-        <p:nvSpPr>
           <p:cNvPr id="3" name="Slide Number Placeholder 2">
             <a:extLst>
               <a:ext uri="{FF2B5EF4-FFF2-40B4-BE49-F238E27FC236}">
@@ -11088,49 +10789,9 @@
             <a:fld id="{888928BD-9DD5-4B49-B597-3FD2BD4272DD}" type="slidenum">
               <a:rPr smtClean="0"/>
               <a:pPr/>
-              <a:t>14</a:t>
+              <a:t>13</a:t>
             </a:fld>
             <a:endParaRPr dirty="0"/>
-          </a:p>
-        </p:txBody>
-      </p:sp>
-      <p:sp>
-        <p:nvSpPr>
-          <p:cNvPr id="5" name="Text Placeholder 4">
-            <a:extLst>
-              <a:ext uri="{FF2B5EF4-FFF2-40B4-BE49-F238E27FC236}">
-                <a16:creationId xmlns:a16="http://schemas.microsoft.com/office/drawing/2014/main" id="{E550BF31-3F58-5545-8936-5F365D1642EF}"/>
-              </a:ext>
-            </a:extLst>
-          </p:cNvPr>
-          <p:cNvSpPr>
-            <a:spLocks noGrp="1"/>
-          </p:cNvSpPr>
-          <p:nvPr>
-            <p:ph type="body" sz="quarter" idx="13"/>
-          </p:nvPr>
-        </p:nvSpPr>
-        <p:spPr>
-          <a:xfrm>
-            <a:off x="6254750" y="499867"/>
-            <a:ext cx="3627380" cy="1214633"/>
-          </a:xfrm>
-        </p:spPr>
-        <p:txBody>
-          <a:bodyPr/>
-          <a:lstStyle/>
-          <a:p>
-            <a:r>
-              <a:rPr lang="en-US" dirty="0"/>
-              <a:t>Planned Web API and SDK work</a:t>
-            </a:r>
-          </a:p>
-          <a:p>
-            <a:pPr algn="r"/>
-            <a:r>
-              <a:rPr lang="en-US" sz="1400" i="1" dirty="0"/>
-              <a:t>Subject to change</a:t>
-            </a:r>
           </a:p>
         </p:txBody>
       </p:sp>
@@ -11286,13 +10947,22 @@
           <a:p>
             <a:pPr algn="ctr"/>
             <a:r>
-              <a:rPr lang="en-US" sz="2000" b="1" i="0" dirty="0">
+              <a:rPr lang="en-US" sz="2000" b="1" dirty="0">
                 <a:solidFill>
                   <a:schemeClr val="bg1"/>
                 </a:solidFill>
                 <a:latin typeface="Sage Text" panose="02010503040201060103" pitchFamily="2" charset="77"/>
               </a:rPr>
-              <a:t>Target – 2024.0</a:t>
+              <a:t>Completed</a:t>
+            </a:r>
+            <a:r>
+              <a:rPr lang="en-US" sz="2000" b="1" i="0" dirty="0">
+                <a:solidFill>
+                  <a:schemeClr val="bg1"/>
+                </a:solidFill>
+                <a:latin typeface="Sage Text" panose="02010503040201060103" pitchFamily="2" charset="77"/>
+              </a:rPr>
+              <a:t>– 2024.1</a:t>
             </a:r>
           </a:p>
         </p:txBody>
@@ -12257,7 +11927,7 @@
 </p:sld>
 </file>
 
-<file path=ppt/slides/slide15.xml><?xml version="1.0" encoding="utf-8"?>
+<file path=ppt/slides/slide14.xml><?xml version="1.0" encoding="utf-8"?>
 <p:sld xmlns:a="http://schemas.openxmlformats.org/drawingml/2006/main" xmlns:r="http://schemas.openxmlformats.org/officeDocument/2006/relationships" xmlns:p="http://schemas.openxmlformats.org/presentationml/2006/main">
   <p:cSld>
     <p:spTree>
@@ -12276,34 +11946,6 @@
       </p:grpSpPr>
       <p:sp>
         <p:nvSpPr>
-          <p:cNvPr id="4" name="Title 3">
-            <a:extLst>
-              <a:ext uri="{FF2B5EF4-FFF2-40B4-BE49-F238E27FC236}">
-                <a16:creationId xmlns:a16="http://schemas.microsoft.com/office/drawing/2014/main" id="{AA89E543-146D-294F-9FD3-AF6A4DE2627F}"/>
-              </a:ext>
-            </a:extLst>
-          </p:cNvPr>
-          <p:cNvSpPr>
-            <a:spLocks noGrp="1"/>
-          </p:cNvSpPr>
-          <p:nvPr>
-            <p:ph type="title"/>
-          </p:nvPr>
-        </p:nvSpPr>
-        <p:spPr/>
-        <p:txBody>
-          <a:bodyPr/>
-          <a:lstStyle/>
-          <a:p>
-            <a:r>
-              <a:rPr lang="en-US" dirty="0"/>
-              <a:t>Upcoming Items</a:t>
-            </a:r>
-          </a:p>
-        </p:txBody>
-      </p:sp>
-      <p:sp>
-        <p:nvSpPr>
           <p:cNvPr id="3" name="Slide Number Placeholder 2">
             <a:extLst>
               <a:ext uri="{FF2B5EF4-FFF2-40B4-BE49-F238E27FC236}">
@@ -12330,49 +11972,9 @@
             <a:fld id="{888928BD-9DD5-4B49-B597-3FD2BD4272DD}" type="slidenum">
               <a:rPr smtClean="0"/>
               <a:pPr/>
-              <a:t>15</a:t>
+              <a:t>14</a:t>
             </a:fld>
             <a:endParaRPr dirty="0"/>
-          </a:p>
-        </p:txBody>
-      </p:sp>
-      <p:sp>
-        <p:nvSpPr>
-          <p:cNvPr id="5" name="Text Placeholder 4">
-            <a:extLst>
-              <a:ext uri="{FF2B5EF4-FFF2-40B4-BE49-F238E27FC236}">
-                <a16:creationId xmlns:a16="http://schemas.microsoft.com/office/drawing/2014/main" id="{E550BF31-3F58-5545-8936-5F365D1642EF}"/>
-              </a:ext>
-            </a:extLst>
-          </p:cNvPr>
-          <p:cNvSpPr>
-            <a:spLocks noGrp="1"/>
-          </p:cNvSpPr>
-          <p:nvPr>
-            <p:ph type="body" sz="quarter" idx="13"/>
-          </p:nvPr>
-        </p:nvSpPr>
-        <p:spPr>
-          <a:xfrm>
-            <a:off x="6254750" y="499867"/>
-            <a:ext cx="3627380" cy="1214633"/>
-          </a:xfrm>
-        </p:spPr>
-        <p:txBody>
-          <a:bodyPr/>
-          <a:lstStyle/>
-          <a:p>
-            <a:r>
-              <a:rPr lang="en-US" dirty="0"/>
-              <a:t>Planned Web API and SDK work</a:t>
-            </a:r>
-          </a:p>
-          <a:p>
-            <a:pPr algn="r"/>
-            <a:r>
-              <a:rPr lang="en-US" sz="1400" i="1" dirty="0"/>
-              <a:t>Subject to change</a:t>
-            </a:r>
           </a:p>
         </p:txBody>
       </p:sp>
@@ -12528,13 +12130,22 @@
           <a:p>
             <a:pPr algn="ctr"/>
             <a:r>
-              <a:rPr lang="en-US" sz="2000" b="1" i="0" dirty="0">
+              <a:rPr lang="en-US" sz="2000" b="1" dirty="0">
                 <a:solidFill>
                   <a:schemeClr val="bg1"/>
                 </a:solidFill>
                 <a:latin typeface="Sage Text" panose="02010503040201060103" pitchFamily="2" charset="77"/>
               </a:rPr>
-              <a:t>Target – 2024.x</a:t>
+              <a:t>Completed</a:t>
+            </a:r>
+            <a:r>
+              <a:rPr lang="en-US" sz="2000" b="1" i="0" dirty="0">
+                <a:solidFill>
+                  <a:schemeClr val="bg1"/>
+                </a:solidFill>
+                <a:latin typeface="Sage Text" panose="02010503040201060103" pitchFamily="2" charset="77"/>
+              </a:rPr>
+              <a:t> – 2024.2</a:t>
             </a:r>
           </a:p>
         </p:txBody>
@@ -12553,8 +12164,8 @@
         </p:nvSpPr>
         <p:spPr>
           <a:xfrm>
-            <a:off x="2123557" y="3203130"/>
-            <a:ext cx="4519614" cy="1946687"/>
+            <a:off x="2123556" y="3203130"/>
+            <a:ext cx="4761979" cy="2654573"/>
           </a:xfrm>
           <a:prstGeom prst="rect">
             <a:avLst/>
@@ -12572,7 +12183,7 @@
               <a:rPr lang="en-US" b="1" dirty="0">
                 <a:latin typeface="Sage Text" panose="02010503040201060103" pitchFamily="2" charset="77"/>
               </a:rPr>
-              <a:t>Customization “Before ID” logic is Incorrect</a:t>
+              <a:t>Subclassing Framework Web and Web API</a:t>
             </a:r>
           </a:p>
           <a:p>
@@ -12590,8 +12201,17 @@
               <a:rPr lang="en-US" sz="1600" dirty="0">
                 <a:latin typeface="Sage Text" panose="02010503040201060103" pitchFamily="2" charset="77"/>
               </a:rPr>
-              <a:t>When creating a customization and determining widget placement, if a widget is required, does not respond to this property. </a:t>
-            </a:r>
+              <a:t>Two new wizards have been created for the Web Screens and one new wizard for the Web API to support partner subclassing of a business view while the Web Screen’s framework has been enhanced to performing the extended field mapping.</a:t>
+            </a:r>
+          </a:p>
+          <a:p>
+            <a:pPr algn="l"/>
+            <a:endParaRPr lang="en-US" sz="1600" b="0" i="0" dirty="0">
+              <a:solidFill>
+                <a:schemeClr val="tx1"/>
+              </a:solidFill>
+              <a:latin typeface="Sage Text" panose="02010503040201060103" pitchFamily="2" charset="77"/>
+            </a:endParaRPr>
           </a:p>
           <a:p>
             <a:pPr algn="l"/>
@@ -12599,7 +12219,7 @@
               <a:rPr lang="en-US" sz="1600" dirty="0">
                 <a:latin typeface="Sage Text" panose="02010503040201060103" pitchFamily="2" charset="77"/>
               </a:rPr>
-              <a:t>The desire is to properly react to placement of a widget either before or after a target widget.</a:t>
+              <a:t>The Customization Framework does not require enhancements to be able to create a customization package for the extended field(s).</a:t>
             </a:r>
             <a:endParaRPr lang="en-US" sz="1050" b="0" i="0" dirty="0">
               <a:solidFill>
@@ -12610,10 +12230,579 @@
           </a:p>
         </p:txBody>
       </p:sp>
+      <p:sp>
+        <p:nvSpPr>
+          <p:cNvPr id="9" name="Title 1">
+            <a:extLst>
+              <a:ext uri="{FF2B5EF4-FFF2-40B4-BE49-F238E27FC236}">
+                <a16:creationId xmlns:a16="http://schemas.microsoft.com/office/drawing/2014/main" id="{70FE50BD-0A95-5F3B-5B05-CF381EC8F88B}"/>
+              </a:ext>
+            </a:extLst>
+          </p:cNvPr>
+          <p:cNvSpPr>
+            <a:spLocks noGrp="1"/>
+          </p:cNvSpPr>
+          <p:nvPr>
+            <p:ph type="title"/>
+          </p:nvPr>
+        </p:nvSpPr>
+        <p:spPr>
+          <a:xfrm>
+            <a:off x="411479" y="301486"/>
+            <a:ext cx="11353799" cy="594360"/>
+          </a:xfrm>
+        </p:spPr>
+        <p:txBody>
+          <a:bodyPr/>
+          <a:lstStyle/>
+          <a:p>
+            <a:r>
+              <a:rPr lang="en-US" dirty="0"/>
+              <a:t>What’s New</a:t>
+            </a:r>
+          </a:p>
+        </p:txBody>
+      </p:sp>
+      <p:sp>
+        <p:nvSpPr>
+          <p:cNvPr id="11" name="Text Placeholder 2">
+            <a:extLst>
+              <a:ext uri="{FF2B5EF4-FFF2-40B4-BE49-F238E27FC236}">
+                <a16:creationId xmlns:a16="http://schemas.microsoft.com/office/drawing/2014/main" id="{4D167553-C0D9-313E-5C33-F0AA28E2AEAB}"/>
+              </a:ext>
+            </a:extLst>
+          </p:cNvPr>
+          <p:cNvSpPr txBox="1">
+            <a:spLocks/>
+          </p:cNvSpPr>
+          <p:nvPr/>
+        </p:nvSpPr>
+        <p:spPr>
+          <a:xfrm>
+            <a:off x="419098" y="1138680"/>
+            <a:ext cx="11346180" cy="438912"/>
+          </a:xfrm>
+          <a:prstGeom prst="rect">
+            <a:avLst/>
+          </a:prstGeom>
+        </p:spPr>
+        <p:txBody>
+          <a:bodyPr/>
+          <a:lstStyle>
+            <a:lvl1pPr marL="228600" indent="-228600" algn="l" defTabSz="914400" rtl="0" eaLnBrk="1" latinLnBrk="0" hangingPunct="1">
+              <a:lnSpc>
+                <a:spcPct val="100000"/>
+              </a:lnSpc>
+              <a:spcBef>
+                <a:spcPts val="1000"/>
+              </a:spcBef>
+              <a:buFont typeface="Sage Text" panose="02010503040201060103" pitchFamily="50" charset="0"/>
+              <a:buChar char="•"/>
+              <a:defRPr lang="en-US" sz="2001" b="0" i="0" kern="1200" dirty="0" smtClean="0">
+                <a:solidFill>
+                  <a:schemeClr val="bg1"/>
+                </a:solidFill>
+                <a:latin typeface="Sage Text" panose="02010503040201060103" pitchFamily="2" charset="77"/>
+                <a:ea typeface="+mn-ea"/>
+                <a:cs typeface="+mn-cs"/>
+              </a:defRPr>
+            </a:lvl1pPr>
+            <a:lvl2pPr marL="342900" indent="-342900" algn="l" defTabSz="914400" rtl="0" eaLnBrk="1" latinLnBrk="0" hangingPunct="1">
+              <a:lnSpc>
+                <a:spcPct val="100000"/>
+              </a:lnSpc>
+              <a:spcBef>
+                <a:spcPts val="500"/>
+              </a:spcBef>
+              <a:buFont typeface="Sage Text" panose="02010503040201060103" pitchFamily="50" charset="0"/>
+              <a:buChar char="•"/>
+              <a:defRPr lang="en-US" sz="2001" b="0" i="0" kern="1200" dirty="0" smtClean="0">
+                <a:solidFill>
+                  <a:schemeClr val="bg1"/>
+                </a:solidFill>
+                <a:latin typeface="Sage Text" panose="02010503040201060103" pitchFamily="2" charset="77"/>
+                <a:ea typeface="+mn-ea"/>
+                <a:cs typeface="+mn-cs"/>
+              </a:defRPr>
+            </a:lvl2pPr>
+            <a:lvl3pPr marL="685800" indent="-342900" algn="l" defTabSz="914400" rtl="0" eaLnBrk="1" latinLnBrk="0" hangingPunct="1">
+              <a:lnSpc>
+                <a:spcPct val="100000"/>
+              </a:lnSpc>
+              <a:spcBef>
+                <a:spcPts val="500"/>
+              </a:spcBef>
+              <a:buFont typeface="Sage Text" panose="02010503040201060103" pitchFamily="50" charset="0"/>
+              <a:buChar char="•"/>
+              <a:defRPr lang="en-US" sz="1801" b="0" i="0" kern="1200" dirty="0" smtClean="0">
+                <a:solidFill>
+                  <a:schemeClr val="bg1"/>
+                </a:solidFill>
+                <a:latin typeface="Sage Text" panose="02010503040201060103" pitchFamily="2" charset="77"/>
+                <a:ea typeface="+mn-ea"/>
+                <a:cs typeface="+mn-cs"/>
+              </a:defRPr>
+            </a:lvl3pPr>
+            <a:lvl4pPr marL="974725" indent="-285750" algn="l" defTabSz="914400" rtl="0" eaLnBrk="1" latinLnBrk="0" hangingPunct="1">
+              <a:lnSpc>
+                <a:spcPct val="100000"/>
+              </a:lnSpc>
+              <a:spcBef>
+                <a:spcPts val="500"/>
+              </a:spcBef>
+              <a:buFont typeface="Sage Text" panose="02010503040201060103" pitchFamily="50" charset="0"/>
+              <a:buChar char="•"/>
+              <a:defRPr lang="en-US" sz="1600" b="0" i="0" kern="1200" dirty="0" smtClean="0">
+                <a:solidFill>
+                  <a:schemeClr val="bg1"/>
+                </a:solidFill>
+                <a:latin typeface="Sage Text" panose="02010503040201060103" pitchFamily="2" charset="77"/>
+                <a:ea typeface="+mn-ea"/>
+                <a:cs typeface="+mn-cs"/>
+              </a:defRPr>
+            </a:lvl4pPr>
+            <a:lvl5pPr marL="1314450" indent="-285750" algn="l" defTabSz="914400" rtl="0" eaLnBrk="1" latinLnBrk="0" hangingPunct="1">
+              <a:lnSpc>
+                <a:spcPct val="100000"/>
+              </a:lnSpc>
+              <a:spcBef>
+                <a:spcPts val="500"/>
+              </a:spcBef>
+              <a:buFont typeface="Sage Text" panose="02010503040201060103" pitchFamily="50" charset="0"/>
+              <a:buChar char="•"/>
+              <a:defRPr lang="en-US" sz="1400" b="0" i="0" kern="1200" dirty="0">
+                <a:solidFill>
+                  <a:schemeClr val="bg1"/>
+                </a:solidFill>
+                <a:latin typeface="Sage Text" panose="02010503040201060103" pitchFamily="2" charset="77"/>
+                <a:ea typeface="+mn-ea"/>
+                <a:cs typeface="+mn-cs"/>
+              </a:defRPr>
+            </a:lvl5pPr>
+            <a:lvl6pPr marL="2514600" indent="-228600" algn="l" defTabSz="914400" rtl="0" eaLnBrk="1" latinLnBrk="0" hangingPunct="1">
+              <a:lnSpc>
+                <a:spcPct val="90000"/>
+              </a:lnSpc>
+              <a:spcBef>
+                <a:spcPts val="500"/>
+              </a:spcBef>
+              <a:buFont typeface="Sage Text" panose="02010503040201060103" pitchFamily="50" charset="0"/>
+              <a:buChar char="•"/>
+              <a:defRPr sz="1800" kern="1200">
+                <a:solidFill>
+                  <a:schemeClr val="tx1"/>
+                </a:solidFill>
+                <a:latin typeface="+mn-lt"/>
+                <a:ea typeface="+mn-ea"/>
+                <a:cs typeface="+mn-cs"/>
+              </a:defRPr>
+            </a:lvl6pPr>
+            <a:lvl7pPr marL="2971800" indent="-228600" algn="l" defTabSz="914400" rtl="0" eaLnBrk="1" latinLnBrk="0" hangingPunct="1">
+              <a:lnSpc>
+                <a:spcPct val="90000"/>
+              </a:lnSpc>
+              <a:spcBef>
+                <a:spcPts val="500"/>
+              </a:spcBef>
+              <a:buFont typeface="Sage Text" panose="02010503040201060103" pitchFamily="50" charset="0"/>
+              <a:buChar char="•"/>
+              <a:defRPr sz="1800" kern="1200">
+                <a:solidFill>
+                  <a:schemeClr val="tx1"/>
+                </a:solidFill>
+                <a:latin typeface="+mn-lt"/>
+                <a:ea typeface="+mn-ea"/>
+                <a:cs typeface="+mn-cs"/>
+              </a:defRPr>
+            </a:lvl7pPr>
+            <a:lvl8pPr marL="3429000" indent="-228600" algn="l" defTabSz="914400" rtl="0" eaLnBrk="1" latinLnBrk="0" hangingPunct="1">
+              <a:lnSpc>
+                <a:spcPct val="90000"/>
+              </a:lnSpc>
+              <a:spcBef>
+                <a:spcPts val="500"/>
+              </a:spcBef>
+              <a:buFont typeface="Sage Text" panose="02010503040201060103" pitchFamily="50" charset="0"/>
+              <a:buChar char="•"/>
+              <a:defRPr sz="1800" kern="1200">
+                <a:solidFill>
+                  <a:schemeClr val="tx1"/>
+                </a:solidFill>
+                <a:latin typeface="+mn-lt"/>
+                <a:ea typeface="+mn-ea"/>
+                <a:cs typeface="+mn-cs"/>
+              </a:defRPr>
+            </a:lvl8pPr>
+            <a:lvl9pPr marL="3886200" indent="-228600" algn="l" defTabSz="914400" rtl="0" eaLnBrk="1" latinLnBrk="0" hangingPunct="1">
+              <a:lnSpc>
+                <a:spcPct val="90000"/>
+              </a:lnSpc>
+              <a:spcBef>
+                <a:spcPts val="500"/>
+              </a:spcBef>
+              <a:buFont typeface="Sage Text" panose="02010503040201060103" pitchFamily="50" charset="0"/>
+              <a:buChar char="•"/>
+              <a:defRPr sz="1800" kern="1200">
+                <a:solidFill>
+                  <a:schemeClr val="tx1"/>
+                </a:solidFill>
+                <a:latin typeface="+mn-lt"/>
+                <a:ea typeface="+mn-ea"/>
+                <a:cs typeface="+mn-cs"/>
+              </a:defRPr>
+            </a:lvl9pPr>
+          </a:lstStyle>
+          <a:p>
+            <a:pPr marL="0" indent="0">
+              <a:buNone/>
+            </a:pPr>
+            <a:r>
+              <a:rPr lang="en-US" b="1" dirty="0">
+                <a:solidFill>
+                  <a:schemeClr val="accent1"/>
+                </a:solidFill>
+              </a:rPr>
+              <a:t>Subclassing Framework</a:t>
+            </a:r>
+          </a:p>
+        </p:txBody>
+      </p:sp>
+      <p:pic>
+        <p:nvPicPr>
+          <p:cNvPr id="2" name="Picture 1">
+            <a:extLst>
+              <a:ext uri="{FF2B5EF4-FFF2-40B4-BE49-F238E27FC236}">
+                <a16:creationId xmlns:a16="http://schemas.microsoft.com/office/drawing/2014/main" id="{FD89B601-E7D3-906E-A991-426DB0EAAEB0}"/>
+              </a:ext>
+            </a:extLst>
+          </p:cNvPr>
+          <p:cNvPicPr>
+            <a:picLocks noChangeAspect="1"/>
+          </p:cNvPicPr>
+          <p:nvPr/>
+        </p:nvPicPr>
+        <p:blipFill>
+          <a:blip r:embed="rId2"/>
+          <a:stretch>
+            <a:fillRect/>
+          </a:stretch>
+        </p:blipFill>
+        <p:spPr>
+          <a:xfrm>
+            <a:off x="8333931" y="1714500"/>
+            <a:ext cx="3096397" cy="4004821"/>
+          </a:xfrm>
+          <a:prstGeom prst="rect">
+            <a:avLst/>
+          </a:prstGeom>
+        </p:spPr>
+      </p:pic>
     </p:spTree>
     <p:extLst>
       <p:ext uri="{BB962C8B-B14F-4D97-AF65-F5344CB8AC3E}">
-        <p14:creationId xmlns:p14="http://schemas.microsoft.com/office/powerpoint/2010/main" val="1093278816"/>
+        <p14:creationId xmlns:p14="http://schemas.microsoft.com/office/powerpoint/2010/main" val="1075052511"/>
+      </p:ext>
+    </p:extLst>
+  </p:cSld>
+  <p:clrMapOvr>
+    <a:masterClrMapping/>
+  </p:clrMapOvr>
+</p:sld>
+</file>
+
+<file path=ppt/slides/slide15.xml><?xml version="1.0" encoding="utf-8"?>
+<p:sld xmlns:a="http://schemas.openxmlformats.org/drawingml/2006/main" xmlns:r="http://schemas.openxmlformats.org/officeDocument/2006/relationships" xmlns:p="http://schemas.openxmlformats.org/presentationml/2006/main">
+  <p:cSld>
+    <p:spTree>
+      <p:nvGrpSpPr>
+        <p:cNvPr id="1" name=""/>
+        <p:cNvGrpSpPr/>
+        <p:nvPr/>
+      </p:nvGrpSpPr>
+      <p:grpSpPr>
+        <a:xfrm>
+          <a:off x="0" y="0"/>
+          <a:ext cx="0" cy="0"/>
+          <a:chOff x="0" y="0"/>
+          <a:chExt cx="0" cy="0"/>
+        </a:xfrm>
+      </p:grpSpPr>
+      <p:sp>
+        <p:nvSpPr>
+          <p:cNvPr id="4" name="Title 3">
+            <a:extLst>
+              <a:ext uri="{FF2B5EF4-FFF2-40B4-BE49-F238E27FC236}">
+                <a16:creationId xmlns:a16="http://schemas.microsoft.com/office/drawing/2014/main" id="{3926F967-C1B1-2E43-8EFA-7467B6AD7017}"/>
+              </a:ext>
+            </a:extLst>
+          </p:cNvPr>
+          <p:cNvSpPr>
+            <a:spLocks noGrp="1"/>
+          </p:cNvSpPr>
+          <p:nvPr>
+            <p:ph type="title"/>
+          </p:nvPr>
+        </p:nvSpPr>
+        <p:spPr/>
+        <p:txBody>
+          <a:bodyPr/>
+          <a:lstStyle/>
+          <a:p>
+            <a:r>
+              <a:rPr lang="en-US" dirty="0"/>
+              <a:t>Upcoming Items</a:t>
+            </a:r>
+          </a:p>
+        </p:txBody>
+      </p:sp>
+      <p:sp>
+        <p:nvSpPr>
+          <p:cNvPr id="2" name="Slide Number Placeholder 1">
+            <a:extLst>
+              <a:ext uri="{FF2B5EF4-FFF2-40B4-BE49-F238E27FC236}">
+                <a16:creationId xmlns:a16="http://schemas.microsoft.com/office/drawing/2014/main" id="{32B9BF9A-1DC4-4A40-B990-C2C3F5814935}"/>
+              </a:ext>
+            </a:extLst>
+          </p:cNvPr>
+          <p:cNvSpPr>
+            <a:spLocks noGrp="1"/>
+          </p:cNvSpPr>
+          <p:nvPr>
+            <p:ph type="sldNum" sz="quarter" idx="4294967295"/>
+          </p:nvPr>
+        </p:nvSpPr>
+        <p:spPr>
+          <a:xfrm>
+            <a:off x="11595100" y="6370638"/>
+            <a:ext cx="596900" cy="365125"/>
+          </a:xfrm>
+        </p:spPr>
+        <p:txBody>
+          <a:bodyPr/>
+          <a:lstStyle/>
+          <a:p>
+            <a:r>
+              <a:rPr lang="en-US">
+                <a:latin typeface="Sage Text Light" panose="02010303040201060103" pitchFamily="2" charset="77"/>
+              </a:rPr>
+              <a:t>Page </a:t>
+            </a:r>
+            <a:fld id="{C801F209-6BE7-4AF7-9211-E3F7558EC97C}" type="slidenum">
+              <a:rPr smtClean="0">
+                <a:latin typeface="Sage Text Light" panose="02010303040201060103" pitchFamily="2" charset="77"/>
+              </a:rPr>
+              <a:pPr/>
+              <a:t>15</a:t>
+            </a:fld>
+            <a:endParaRPr dirty="0">
+              <a:latin typeface="Sage Text Light" panose="02010303040201060103" pitchFamily="2" charset="77"/>
+            </a:endParaRPr>
+          </a:p>
+        </p:txBody>
+      </p:sp>
+      <p:sp>
+        <p:nvSpPr>
+          <p:cNvPr id="3" name="Subtitle 2">
+            <a:extLst>
+              <a:ext uri="{FF2B5EF4-FFF2-40B4-BE49-F238E27FC236}">
+                <a16:creationId xmlns:a16="http://schemas.microsoft.com/office/drawing/2014/main" id="{EA515567-C881-9DDA-4B64-977C04BE7326}"/>
+              </a:ext>
+            </a:extLst>
+          </p:cNvPr>
+          <p:cNvSpPr txBox="1">
+            <a:spLocks/>
+          </p:cNvSpPr>
+          <p:nvPr/>
+        </p:nvSpPr>
+        <p:spPr>
+          <a:xfrm>
+            <a:off x="420623" y="1024338"/>
+            <a:ext cx="3820450" cy="1243584"/>
+          </a:xfrm>
+          <a:prstGeom prst="rect">
+            <a:avLst/>
+          </a:prstGeom>
+        </p:spPr>
+        <p:txBody>
+          <a:bodyPr vert="horz" lIns="0" tIns="45720" rIns="0" bIns="0" rtlCol="0">
+            <a:noAutofit/>
+          </a:bodyPr>
+          <a:lstStyle>
+            <a:lvl1pPr marL="0" indent="0" algn="l" defTabSz="914400" rtl="0" eaLnBrk="1" latinLnBrk="0" hangingPunct="1">
+              <a:lnSpc>
+                <a:spcPct val="100000"/>
+              </a:lnSpc>
+              <a:spcBef>
+                <a:spcPts val="1000"/>
+              </a:spcBef>
+              <a:buFont typeface="Sage Text" panose="02010503040201060103" pitchFamily="50" charset="0"/>
+              <a:buNone/>
+              <a:defRPr lang="en-US" sz="1600" b="1" i="0" kern="1200">
+                <a:solidFill>
+                  <a:schemeClr val="tx2"/>
+                </a:solidFill>
+                <a:latin typeface="Sage Text" panose="02010503040201060103" pitchFamily="2" charset="77"/>
+                <a:ea typeface="+mn-ea"/>
+                <a:cs typeface="+mn-cs"/>
+              </a:defRPr>
+            </a:lvl1pPr>
+            <a:lvl2pPr marL="457200" indent="0" algn="ctr" defTabSz="914400" rtl="0" eaLnBrk="1" latinLnBrk="0" hangingPunct="1">
+              <a:lnSpc>
+                <a:spcPct val="100000"/>
+              </a:lnSpc>
+              <a:spcBef>
+                <a:spcPts val="500"/>
+              </a:spcBef>
+              <a:buFont typeface="Sage Text" panose="02010503040201060103" pitchFamily="50" charset="0"/>
+              <a:buNone/>
+              <a:defRPr lang="en-US" sz="2000" b="0" i="0" kern="1200">
+                <a:solidFill>
+                  <a:schemeClr val="bg1"/>
+                </a:solidFill>
+                <a:latin typeface="Sage Text" panose="02010503040201060103" pitchFamily="2" charset="77"/>
+                <a:ea typeface="+mn-ea"/>
+                <a:cs typeface="+mn-cs"/>
+              </a:defRPr>
+            </a:lvl2pPr>
+            <a:lvl3pPr marL="914400" indent="0" algn="ctr" defTabSz="914400" rtl="0" eaLnBrk="1" latinLnBrk="0" hangingPunct="1">
+              <a:lnSpc>
+                <a:spcPct val="100000"/>
+              </a:lnSpc>
+              <a:spcBef>
+                <a:spcPts val="500"/>
+              </a:spcBef>
+              <a:buFont typeface="Sage Text" panose="02010503040201060103" pitchFamily="50" charset="0"/>
+              <a:buNone/>
+              <a:defRPr lang="en-US" sz="1800" b="0" i="0" kern="1200">
+                <a:solidFill>
+                  <a:schemeClr val="bg1"/>
+                </a:solidFill>
+                <a:latin typeface="Sage Text" panose="02010503040201060103" pitchFamily="2" charset="77"/>
+                <a:ea typeface="+mn-ea"/>
+                <a:cs typeface="+mn-cs"/>
+              </a:defRPr>
+            </a:lvl3pPr>
+            <a:lvl4pPr marL="1371600" indent="0" algn="ctr" defTabSz="914400" rtl="0" eaLnBrk="1" latinLnBrk="0" hangingPunct="1">
+              <a:lnSpc>
+                <a:spcPct val="100000"/>
+              </a:lnSpc>
+              <a:spcBef>
+                <a:spcPts val="500"/>
+              </a:spcBef>
+              <a:buFont typeface="Sage Text" panose="02010503040201060103" pitchFamily="50" charset="0"/>
+              <a:buNone/>
+              <a:defRPr lang="en-US" sz="1600" b="0" i="0" kern="1200">
+                <a:solidFill>
+                  <a:schemeClr val="bg1"/>
+                </a:solidFill>
+                <a:latin typeface="Sage Text" panose="02010503040201060103" pitchFamily="2" charset="77"/>
+                <a:ea typeface="+mn-ea"/>
+                <a:cs typeface="+mn-cs"/>
+              </a:defRPr>
+            </a:lvl4pPr>
+            <a:lvl5pPr marL="1828800" indent="0" algn="ctr" defTabSz="914400" rtl="0" eaLnBrk="1" latinLnBrk="0" hangingPunct="1">
+              <a:lnSpc>
+                <a:spcPct val="100000"/>
+              </a:lnSpc>
+              <a:spcBef>
+                <a:spcPts val="500"/>
+              </a:spcBef>
+              <a:buFont typeface="Sage Text" panose="02010503040201060103" pitchFamily="50" charset="0"/>
+              <a:buNone/>
+              <a:defRPr lang="en-US" sz="1600" b="0" i="0" kern="1200">
+                <a:solidFill>
+                  <a:schemeClr val="bg1"/>
+                </a:solidFill>
+                <a:latin typeface="Sage Text" panose="02010503040201060103" pitchFamily="2" charset="77"/>
+                <a:ea typeface="+mn-ea"/>
+                <a:cs typeface="+mn-cs"/>
+              </a:defRPr>
+            </a:lvl5pPr>
+            <a:lvl6pPr marL="2286000" indent="0" algn="ctr" defTabSz="914400" rtl="0" eaLnBrk="1" latinLnBrk="0" hangingPunct="1">
+              <a:lnSpc>
+                <a:spcPct val="90000"/>
+              </a:lnSpc>
+              <a:spcBef>
+                <a:spcPts val="500"/>
+              </a:spcBef>
+              <a:buFont typeface="Sage Text" panose="02010503040201060103" pitchFamily="50" charset="0"/>
+              <a:buNone/>
+              <a:defRPr sz="1600" kern="1200">
+                <a:solidFill>
+                  <a:schemeClr val="tx1"/>
+                </a:solidFill>
+                <a:latin typeface="+mn-lt"/>
+                <a:ea typeface="+mn-ea"/>
+                <a:cs typeface="+mn-cs"/>
+              </a:defRPr>
+            </a:lvl6pPr>
+            <a:lvl7pPr marL="2743200" indent="0" algn="ctr" defTabSz="914400" rtl="0" eaLnBrk="1" latinLnBrk="0" hangingPunct="1">
+              <a:lnSpc>
+                <a:spcPct val="90000"/>
+              </a:lnSpc>
+              <a:spcBef>
+                <a:spcPts val="500"/>
+              </a:spcBef>
+              <a:buFont typeface="Sage Text" panose="02010503040201060103" pitchFamily="50" charset="0"/>
+              <a:buNone/>
+              <a:defRPr sz="1600" kern="1200">
+                <a:solidFill>
+                  <a:schemeClr val="tx1"/>
+                </a:solidFill>
+                <a:latin typeface="+mn-lt"/>
+                <a:ea typeface="+mn-ea"/>
+                <a:cs typeface="+mn-cs"/>
+              </a:defRPr>
+            </a:lvl7pPr>
+            <a:lvl8pPr marL="3200400" indent="0" algn="ctr" defTabSz="914400" rtl="0" eaLnBrk="1" latinLnBrk="0" hangingPunct="1">
+              <a:lnSpc>
+                <a:spcPct val="90000"/>
+              </a:lnSpc>
+              <a:spcBef>
+                <a:spcPts val="500"/>
+              </a:spcBef>
+              <a:buFont typeface="Sage Text" panose="02010503040201060103" pitchFamily="50" charset="0"/>
+              <a:buNone/>
+              <a:defRPr sz="1600" kern="1200">
+                <a:solidFill>
+                  <a:schemeClr val="tx1"/>
+                </a:solidFill>
+                <a:latin typeface="+mn-lt"/>
+                <a:ea typeface="+mn-ea"/>
+                <a:cs typeface="+mn-cs"/>
+              </a:defRPr>
+            </a:lvl8pPr>
+            <a:lvl9pPr marL="3657600" indent="0" algn="ctr" defTabSz="914400" rtl="0" eaLnBrk="1" latinLnBrk="0" hangingPunct="1">
+              <a:lnSpc>
+                <a:spcPct val="90000"/>
+              </a:lnSpc>
+              <a:spcBef>
+                <a:spcPts val="500"/>
+              </a:spcBef>
+              <a:buFont typeface="Sage Text" panose="02010503040201060103" pitchFamily="50" charset="0"/>
+              <a:buNone/>
+              <a:defRPr sz="1600" kern="1200">
+                <a:solidFill>
+                  <a:schemeClr val="tx1"/>
+                </a:solidFill>
+                <a:latin typeface="+mn-lt"/>
+                <a:ea typeface="+mn-ea"/>
+                <a:cs typeface="+mn-cs"/>
+              </a:defRPr>
+            </a:lvl9pPr>
+          </a:lstStyle>
+          <a:p>
+            <a:r>
+              <a:rPr lang="en-US" sz="2400" b="0" dirty="0"/>
+              <a:t>Overview</a:t>
+            </a:r>
+          </a:p>
+        </p:txBody>
+      </p:sp>
+    </p:spTree>
+    <p:extLst>
+      <p:ext uri="{BB962C8B-B14F-4D97-AF65-F5344CB8AC3E}">
+        <p14:creationId xmlns:p14="http://schemas.microsoft.com/office/powerpoint/2010/main" val="3023662932"/>
       </p:ext>
     </p:extLst>
   </p:cSld>
@@ -12894,22 +13083,13 @@
           <a:p>
             <a:pPr algn="ctr"/>
             <a:r>
-              <a:rPr lang="en-US" sz="2000" b="1" dirty="0">
+              <a:rPr lang="en-US" sz="2000" b="1" i="0" dirty="0">
                 <a:solidFill>
                   <a:schemeClr val="bg1"/>
                 </a:solidFill>
                 <a:latin typeface="Sage Text" panose="02010503040201060103" pitchFamily="2" charset="77"/>
               </a:rPr>
-              <a:t>Target</a:t>
-            </a:r>
-            <a:r>
-              <a:rPr lang="en-US" sz="2000" b="1" i="0" dirty="0">
-                <a:solidFill>
-                  <a:schemeClr val="bg1"/>
-                </a:solidFill>
-                <a:latin typeface="Sage Text" panose="02010503040201060103" pitchFamily="2" charset="77"/>
-              </a:rPr>
-              <a:t> – 2024.x</a:t>
+              <a:t>Target – 2025.x</a:t>
             </a:r>
           </a:p>
         </p:txBody>
@@ -12929,7 +13109,7 @@
         <p:spPr>
           <a:xfrm>
             <a:off x="2123557" y="3203130"/>
-            <a:ext cx="4519614" cy="2408352"/>
+            <a:ext cx="4519614" cy="1946687"/>
           </a:xfrm>
           <a:prstGeom prst="rect">
             <a:avLst/>
@@ -12947,7 +13127,7 @@
               <a:rPr lang="en-US" b="1" dirty="0">
                 <a:latin typeface="Sage Text" panose="02010503040201060103" pitchFamily="2" charset="77"/>
               </a:rPr>
-              <a:t>Web API Error Messages are not Specific</a:t>
+              <a:t>Customization “Before ID” logic is Incorrect</a:t>
             </a:r>
           </a:p>
           <a:p>
@@ -12965,7 +13145,7 @@
               <a:rPr lang="en-US" sz="1600" dirty="0">
                 <a:latin typeface="Sage Text" panose="02010503040201060103" pitchFamily="2" charset="77"/>
               </a:rPr>
-              <a:t>Error messages in the Web API do not raise the specific error message from the server which leads to frustration when attempting to diagnose failure. </a:t>
+              <a:t>When creating a customization and determining widget placement, if a widget is required, does not respond to this property. </a:t>
             </a:r>
           </a:p>
           <a:p>
@@ -12974,7 +13154,7 @@
               <a:rPr lang="en-US" sz="1600" dirty="0">
                 <a:latin typeface="Sage Text" panose="02010503040201060103" pitchFamily="2" charset="77"/>
               </a:rPr>
-              <a:t>The desire is to have specific error messages from server exposed while some messages will continue to remain generic (i.e., authentication, etc.).</a:t>
+              <a:t>The desire is to properly react to placement of a widget either before or after a target widget.</a:t>
             </a:r>
             <a:endParaRPr lang="en-US" sz="1050" b="0" i="0" dirty="0">
               <a:solidFill>
@@ -12988,7 +13168,7 @@
     </p:spTree>
     <p:extLst>
       <p:ext uri="{BB962C8B-B14F-4D97-AF65-F5344CB8AC3E}">
-        <p14:creationId xmlns:p14="http://schemas.microsoft.com/office/powerpoint/2010/main" val="3917672463"/>
+        <p14:creationId xmlns:p14="http://schemas.microsoft.com/office/powerpoint/2010/main" val="1093278816"/>
       </p:ext>
     </p:extLst>
   </p:cSld>
@@ -13269,13 +13449,22 @@
           <a:p>
             <a:pPr algn="ctr"/>
             <a:r>
-              <a:rPr lang="en-US" sz="2000" b="1" i="0" dirty="0">
+              <a:rPr lang="en-US" sz="2000" b="1" dirty="0">
                 <a:solidFill>
                   <a:schemeClr val="bg1"/>
                 </a:solidFill>
                 <a:latin typeface="Sage Text" panose="02010503040201060103" pitchFamily="2" charset="77"/>
               </a:rPr>
-              <a:t>Target – 2024.x</a:t>
+              <a:t>Target</a:t>
+            </a:r>
+            <a:r>
+              <a:rPr lang="en-US" sz="2000" b="1" i="0" dirty="0">
+                <a:solidFill>
+                  <a:schemeClr val="bg1"/>
+                </a:solidFill>
+                <a:latin typeface="Sage Text" panose="02010503040201060103" pitchFamily="2" charset="77"/>
+              </a:rPr>
+              <a:t> – 2025.x</a:t>
             </a:r>
           </a:p>
         </p:txBody>
@@ -13295,7 +13484,7 @@
         <p:spPr>
           <a:xfrm>
             <a:off x="2123557" y="3203130"/>
-            <a:ext cx="4519614" cy="1915909"/>
+            <a:ext cx="4519614" cy="2408352"/>
           </a:xfrm>
           <a:prstGeom prst="rect">
             <a:avLst/>
@@ -13313,7 +13502,7 @@
               <a:rPr lang="en-US" b="1" dirty="0">
                 <a:latin typeface="Sage Text" panose="02010503040201060103" pitchFamily="2" charset="77"/>
               </a:rPr>
-              <a:t>Customization API</a:t>
+              <a:t>Web API Error Messages are not Specific</a:t>
             </a:r>
           </a:p>
           <a:p>
@@ -13331,7 +13520,7 @@
               <a:rPr lang="en-US" sz="1600" dirty="0">
                 <a:latin typeface="Sage Text" panose="02010503040201060103" pitchFamily="2" charset="77"/>
               </a:rPr>
-              <a:t>The administration of web screen customizations are performed by the Customization Administration screen. </a:t>
+              <a:t>Error messages in the Web API do not raise the specific error message from the server which leads to frustration when attempting to diagnose failure. </a:t>
             </a:r>
           </a:p>
           <a:p>
@@ -13340,7 +13529,7 @@
               <a:rPr lang="en-US" sz="1600" dirty="0">
                 <a:latin typeface="Sage Text" panose="02010503040201060103" pitchFamily="2" charset="77"/>
               </a:rPr>
-              <a:t>The desire is to provide a UI-less API for the import and maintenance of web screen customizations.</a:t>
+              <a:t>The desire is to have specific error messages from server exposed while some messages will continue to remain generic (i.e., authentication, etc.).</a:t>
             </a:r>
             <a:endParaRPr lang="en-US" sz="1050" b="0" i="0" dirty="0">
               <a:solidFill>
@@ -13354,7 +13543,7 @@
     </p:spTree>
     <p:extLst>
       <p:ext uri="{BB962C8B-B14F-4D97-AF65-F5344CB8AC3E}">
-        <p14:creationId xmlns:p14="http://schemas.microsoft.com/office/powerpoint/2010/main" val="4071216493"/>
+        <p14:creationId xmlns:p14="http://schemas.microsoft.com/office/powerpoint/2010/main" val="3917672463"/>
       </p:ext>
     </p:extLst>
   </p:cSld>
@@ -13641,7 +13830,7 @@
                 </a:solidFill>
                 <a:latin typeface="Sage Text" panose="02010503040201060103" pitchFamily="2" charset="77"/>
               </a:rPr>
-              <a:t>Target – 2024.x</a:t>
+              <a:t>Target – 2025.x</a:t>
             </a:r>
           </a:p>
         </p:txBody>
@@ -13661,7 +13850,7 @@
         <p:spPr>
           <a:xfrm>
             <a:off x="2123557" y="3203130"/>
-            <a:ext cx="4519614" cy="1423467"/>
+            <a:ext cx="4519614" cy="1915909"/>
           </a:xfrm>
           <a:prstGeom prst="rect">
             <a:avLst/>
@@ -13679,7 +13868,7 @@
               <a:rPr lang="en-US" b="1" dirty="0">
                 <a:latin typeface="Sage Text" panose="02010503040201060103" pitchFamily="2" charset="77"/>
               </a:rPr>
-              <a:t>Web Finder Compatibility with AS0020</a:t>
+              <a:t>Customization API</a:t>
             </a:r>
           </a:p>
           <a:p>
@@ -13694,31 +13883,19 @@
           <a:p>
             <a:pPr algn="l"/>
             <a:r>
-              <a:rPr lang="en-US" sz="1600" b="0" i="0" dirty="0">
-                <a:solidFill>
-                  <a:schemeClr val="tx1"/>
-                </a:solidFill>
-                <a:latin typeface="Sage Text" panose="02010503040201060103" pitchFamily="2" charset="77"/>
-              </a:rPr>
-              <a:t>The web screen finder is not compatible with business view AS0020. </a:t>
-            </a:r>
-          </a:p>
-          <a:p>
-            <a:pPr algn="l"/>
-            <a:r>
-              <a:rPr lang="en-US" sz="1600" b="0" i="0" dirty="0">
-                <a:solidFill>
-                  <a:schemeClr val="tx1"/>
-                </a:solidFill>
-                <a:latin typeface="Sage Text" panose="02010503040201060103" pitchFamily="2" charset="77"/>
-              </a:rPr>
-              <a:t>The desire </a:t>
-            </a:r>
-            <a:r>
               <a:rPr lang="en-US" sz="1600" dirty="0">
                 <a:latin typeface="Sage Text" panose="02010503040201060103" pitchFamily="2" charset="77"/>
               </a:rPr>
-              <a:t>is to allow a finder definition to be successful with this business view.</a:t>
+              <a:t>The administration of web screen customizations are performed by the Customization Administration screen. </a:t>
+            </a:r>
+          </a:p>
+          <a:p>
+            <a:pPr algn="l"/>
+            <a:r>
+              <a:rPr lang="en-US" sz="1600" dirty="0">
+                <a:latin typeface="Sage Text" panose="02010503040201060103" pitchFamily="2" charset="77"/>
+              </a:rPr>
+              <a:t>The desire is to provide a UI-less API for the import and maintenance of web screen customizations.</a:t>
             </a:r>
             <a:endParaRPr lang="en-US" sz="1050" b="0" i="0" dirty="0">
               <a:solidFill>
@@ -13732,7 +13909,7 @@
     </p:spTree>
     <p:extLst>
       <p:ext uri="{BB962C8B-B14F-4D97-AF65-F5344CB8AC3E}">
-        <p14:creationId xmlns:p14="http://schemas.microsoft.com/office/powerpoint/2010/main" val="999409253"/>
+        <p14:creationId xmlns:p14="http://schemas.microsoft.com/office/powerpoint/2010/main" val="4071216493"/>
       </p:ext>
     </p:extLst>
   </p:cSld>
@@ -14019,7 +14196,7 @@
                 </a:solidFill>
                 <a:latin typeface="Sage Text" panose="02010503040201060103" pitchFamily="2" charset="77"/>
               </a:rPr>
-              <a:t>Target – 2024.x</a:t>
+              <a:t>Target – 2025.x</a:t>
             </a:r>
           </a:p>
         </p:txBody>
@@ -14039,7 +14216,7 @@
         <p:spPr>
           <a:xfrm>
             <a:off x="2123557" y="3203130"/>
-            <a:ext cx="4519614" cy="2931572"/>
+            <a:ext cx="4519614" cy="1423467"/>
           </a:xfrm>
           <a:prstGeom prst="rect">
             <a:avLst/>
@@ -14057,7 +14234,7 @@
               <a:rPr lang="en-US" b="1" dirty="0">
                 <a:latin typeface="Sage Text" panose="02010503040201060103" pitchFamily="2" charset="77"/>
               </a:rPr>
-              <a:t>Numeric Composite Helper has hide/show issue.</a:t>
+              <a:t>Web Finder Compatibility with AS0020</a:t>
             </a:r>
           </a:p>
           <a:p>
@@ -14078,7 +14255,7 @@
                 </a:solidFill>
                 <a:latin typeface="Sage Text" panose="02010503040201060103" pitchFamily="2" charset="77"/>
               </a:rPr>
-              <a:t>The numeric composite helper hides the label and input widget successfully, but un-hiding only displays the label. This is due to a layering issue in the supporting helpers. </a:t>
+              <a:t>The web screen finder is not compatible with business view AS0020. </a:t>
             </a:r>
           </a:p>
           <a:p>
@@ -14090,25 +14267,13 @@
                 </a:solidFill>
                 <a:latin typeface="Sage Text" panose="02010503040201060103" pitchFamily="2" charset="77"/>
               </a:rPr>
-              <a:t>The desire is to be able to successfully hide and un-hide widgets as expected. </a:t>
-            </a:r>
-          </a:p>
-          <a:p>
-            <a:pPr algn="l"/>
-            <a:r>
-              <a:rPr lang="en-US" sz="1600" b="0" i="0" dirty="0">
-                <a:solidFill>
-                  <a:schemeClr val="tx1"/>
-                </a:solidFill>
-                <a:latin typeface="Sage Text" panose="02010503040201060103" pitchFamily="2" charset="77"/>
-              </a:rPr>
-              <a:t>Note: A workaround is </a:t>
+              <a:t>The desire </a:t>
             </a:r>
             <a:r>
               <a:rPr lang="en-US" sz="1600" dirty="0">
                 <a:latin typeface="Sage Text" panose="02010503040201060103" pitchFamily="2" charset="77"/>
               </a:rPr>
-              <a:t>to place the hide/un-hide check on the &lt;DIV&gt; element as opposed to using the composite helper property.</a:t>
+              <a:t>is to allow a finder definition to be successful with this business view.</a:t>
             </a:r>
             <a:endParaRPr lang="en-US" sz="1050" b="0" i="0" dirty="0">
               <a:solidFill>
@@ -14122,7 +14287,7 @@
     </p:spTree>
     <p:extLst>
       <p:ext uri="{BB962C8B-B14F-4D97-AF65-F5344CB8AC3E}">
-        <p14:creationId xmlns:p14="http://schemas.microsoft.com/office/powerpoint/2010/main" val="3432195843"/>
+        <p14:creationId xmlns:p14="http://schemas.microsoft.com/office/powerpoint/2010/main" val="999409253"/>
       </p:ext>
     </p:extLst>
   </p:cSld>
@@ -14661,7 +14826,7 @@
                 </a:solidFill>
                 <a:latin typeface="Sage Text" panose="02010503040201060103" pitchFamily="2" charset="77"/>
               </a:rPr>
-              <a:t>Target – 2024.x</a:t>
+              <a:t>Target – 2025.x</a:t>
             </a:r>
           </a:p>
         </p:txBody>
@@ -14681,7 +14846,7 @@
         <p:spPr>
           <a:xfrm>
             <a:off x="2123557" y="3203130"/>
-            <a:ext cx="4519614" cy="2192908"/>
+            <a:ext cx="4519614" cy="2931572"/>
           </a:xfrm>
           <a:prstGeom prst="rect">
             <a:avLst/>
@@ -14699,7 +14864,7 @@
               <a:rPr lang="en-US" b="1" dirty="0">
                 <a:latin typeface="Sage Text" panose="02010503040201060103" pitchFamily="2" charset="77"/>
               </a:rPr>
-              <a:t>Finder Composite Helper does not Implement a Hamburger Label</a:t>
+              <a:t>Numeric Composite Helper has hide/show issue.</a:t>
             </a:r>
           </a:p>
           <a:p>
@@ -14720,7 +14885,7 @@
                 </a:solidFill>
                 <a:latin typeface="Sage Text" panose="02010503040201060103" pitchFamily="2" charset="77"/>
               </a:rPr>
-              <a:t>The finder composite helper has the interface properties to create a hamburger label; however, the composite helper does not have the supporting logic. </a:t>
+              <a:t>The numeric composite helper hides the label and input widget successfully, but un-hiding only displays the label. This is due to a layering issue in the supporting helpers. </a:t>
             </a:r>
           </a:p>
           <a:p>
@@ -14732,7 +14897,25 @@
                 </a:solidFill>
                 <a:latin typeface="Sage Text" panose="02010503040201060103" pitchFamily="2" charset="77"/>
               </a:rPr>
-              <a:t>The desire is to implement this functionality for the exposed interface.</a:t>
+              <a:t>The desire is to be able to successfully hide and un-hide widgets as expected. </a:t>
+            </a:r>
+          </a:p>
+          <a:p>
+            <a:pPr algn="l"/>
+            <a:r>
+              <a:rPr lang="en-US" sz="1600" b="0" i="0" dirty="0">
+                <a:solidFill>
+                  <a:schemeClr val="tx1"/>
+                </a:solidFill>
+                <a:latin typeface="Sage Text" panose="02010503040201060103" pitchFamily="2" charset="77"/>
+              </a:rPr>
+              <a:t>Note: A workaround is </a:t>
+            </a:r>
+            <a:r>
+              <a:rPr lang="en-US" sz="1600" dirty="0">
+                <a:latin typeface="Sage Text" panose="02010503040201060103" pitchFamily="2" charset="77"/>
+              </a:rPr>
+              <a:t>to place the hide/un-hide check on the &lt;DIV&gt; element as opposed to using the composite helper property.</a:t>
             </a:r>
             <a:endParaRPr lang="en-US" sz="1050" b="0" i="0" dirty="0">
               <a:solidFill>
@@ -14746,7 +14929,7 @@
     </p:spTree>
     <p:extLst>
       <p:ext uri="{BB962C8B-B14F-4D97-AF65-F5344CB8AC3E}">
-        <p14:creationId xmlns:p14="http://schemas.microsoft.com/office/powerpoint/2010/main" val="859739209"/>
+        <p14:creationId xmlns:p14="http://schemas.microsoft.com/office/powerpoint/2010/main" val="3432195843"/>
       </p:ext>
     </p:extLst>
   </p:cSld>
@@ -15033,7 +15216,7 @@
                 </a:solidFill>
                 <a:latin typeface="Sage Text" panose="02010503040201060103" pitchFamily="2" charset="77"/>
               </a:rPr>
-              <a:t>Target – 2024.x</a:t>
+              <a:t>Target – 2025.x</a:t>
             </a:r>
           </a:p>
         </p:txBody>
@@ -15053,7 +15236,7 @@
         <p:spPr>
           <a:xfrm>
             <a:off x="2123557" y="3203130"/>
-            <a:ext cx="4519614" cy="1946687"/>
+            <a:ext cx="4519614" cy="2192908"/>
           </a:xfrm>
           <a:prstGeom prst="rect">
             <a:avLst/>
@@ -15071,7 +15254,7 @@
               <a:rPr lang="en-US" b="1" dirty="0">
                 <a:latin typeface="Sage Text" panose="02010503040201060103" pitchFamily="2" charset="77"/>
               </a:rPr>
-              <a:t>Solution Generation Wizard to create {XX}CommonResx file</a:t>
+              <a:t>Finder Composite Helper does not Implement a Hamburger Label</a:t>
             </a:r>
           </a:p>
           <a:p>
@@ -15092,22 +15275,19 @@
                 </a:solidFill>
                 <a:latin typeface="Sage Text" panose="02010503040201060103" pitchFamily="2" charset="77"/>
               </a:rPr>
-              <a:t>Internal Sage solution</a:t>
-            </a:r>
-            <a:r>
-              <a:rPr lang="en-US" sz="1600" dirty="0">
+              <a:t>The finder composite helper has the interface properties to create a hamburger label; however, the composite helper does not have the supporting logic. </a:t>
+            </a:r>
+          </a:p>
+          <a:p>
+            <a:pPr algn="l"/>
+            <a:r>
+              <a:rPr lang="en-US" sz="1600" b="0" i="0" dirty="0">
+                <a:solidFill>
+                  <a:schemeClr val="tx1"/>
+                </a:solidFill>
                 <a:latin typeface="Sage Text" panose="02010503040201060103" pitchFamily="2" charset="77"/>
               </a:rPr>
-              <a:t>s have a common resource file per module, and this should also be done for partner solutions. </a:t>
-            </a:r>
-          </a:p>
-          <a:p>
-            <a:pPr algn="l"/>
-            <a:r>
-              <a:rPr lang="en-US" sz="1600" dirty="0">
-                <a:latin typeface="Sage Text" panose="02010503040201060103" pitchFamily="2" charset="77"/>
-              </a:rPr>
-              <a:t>The desire is to provide this feature for partner solutions.</a:t>
+              <a:t>The desire is to implement this functionality for the exposed interface.</a:t>
             </a:r>
             <a:endParaRPr lang="en-US" sz="1050" b="0" i="0" dirty="0">
               <a:solidFill>
@@ -15121,7 +15301,7 @@
     </p:spTree>
     <p:extLst>
       <p:ext uri="{BB962C8B-B14F-4D97-AF65-F5344CB8AC3E}">
-        <p14:creationId xmlns:p14="http://schemas.microsoft.com/office/powerpoint/2010/main" val="2631513264"/>
+        <p14:creationId xmlns:p14="http://schemas.microsoft.com/office/powerpoint/2010/main" val="859739209"/>
       </p:ext>
     </p:extLst>
   </p:cSld>
@@ -15408,7 +15588,7 @@
                 </a:solidFill>
                 <a:latin typeface="Sage Text" panose="02010503040201060103" pitchFamily="2" charset="77"/>
               </a:rPr>
-              <a:t>Target – 2024.x</a:t>
+              <a:t>Target – 2025.x</a:t>
             </a:r>
           </a:p>
         </p:txBody>
@@ -15428,7 +15608,7 @@
         <p:spPr>
           <a:xfrm>
             <a:off x="2123557" y="3203130"/>
-            <a:ext cx="4519614" cy="2900794"/>
+            <a:ext cx="4519614" cy="1946687"/>
           </a:xfrm>
           <a:prstGeom prst="rect">
             <a:avLst/>
@@ -15446,7 +15626,7 @@
               <a:rPr lang="en-US" b="1" dirty="0">
                 <a:latin typeface="Sage Text" panose="02010503040201060103" pitchFamily="2" charset="77"/>
               </a:rPr>
-              <a:t>Visual Studio 2022 for Development</a:t>
+              <a:t>Solution Generation Wizard to create {XX}CommonResx file</a:t>
             </a:r>
           </a:p>
           <a:p>
@@ -15461,10 +15641,19 @@
           <a:p>
             <a:pPr algn="l"/>
             <a:r>
+              <a:rPr lang="en-US" sz="1600" b="0" i="0" dirty="0">
+                <a:solidFill>
+                  <a:schemeClr val="tx1"/>
+                </a:solidFill>
+                <a:latin typeface="Sage Text" panose="02010503040201060103" pitchFamily="2" charset="77"/>
+              </a:rPr>
+              <a:t>Internal Sage solution</a:t>
+            </a:r>
+            <a:r>
               <a:rPr lang="en-US" sz="1600" dirty="0">
                 <a:latin typeface="Sage Text" panose="02010503040201060103" pitchFamily="2" charset="77"/>
               </a:rPr>
-              <a:t>The Sage 300 Web SDK Wizards are compatible with Visual Studio 2019. With the recent release of Visual Studio 2022, the desire is to have these wizards be compatible with 2022.</a:t>
+              <a:t>s have a common resource file per module, and this should also be done for partner solutions. </a:t>
             </a:r>
           </a:p>
           <a:p>
@@ -15473,7 +15662,7 @@
               <a:rPr lang="en-US" sz="1600" dirty="0">
                 <a:latin typeface="Sage Text" panose="02010503040201060103" pitchFamily="2" charset="77"/>
               </a:rPr>
-              <a:t>Note: This was attempted for the recent release of Sage 300 2023; however, with the new Visual Studio 2022 format, the 2019 wizards are not compatible with 2022 and this could not be overcome for 2023. Work with Microsoft is on-going.</a:t>
+              <a:t>The desire is to provide this feature for partner solutions.</a:t>
             </a:r>
             <a:endParaRPr lang="en-US" sz="1050" b="0" i="0" dirty="0">
               <a:solidFill>
@@ -15487,7 +15676,7 @@
     </p:spTree>
     <p:extLst>
       <p:ext uri="{BB962C8B-B14F-4D97-AF65-F5344CB8AC3E}">
-        <p14:creationId xmlns:p14="http://schemas.microsoft.com/office/powerpoint/2010/main" val="3790535835"/>
+        <p14:creationId xmlns:p14="http://schemas.microsoft.com/office/powerpoint/2010/main" val="2631513264"/>
       </p:ext>
     </p:extLst>
   </p:cSld>
@@ -15774,7 +15963,373 @@
                 </a:solidFill>
                 <a:latin typeface="Sage Text" panose="02010503040201060103" pitchFamily="2" charset="77"/>
               </a:rPr>
-              <a:t>Target – 2024.0</a:t>
+              <a:t>Target – 2024.x</a:t>
+            </a:r>
+          </a:p>
+        </p:txBody>
+      </p:sp>
+      <p:sp>
+        <p:nvSpPr>
+          <p:cNvPr id="25" name="TextBox 24">
+            <a:extLst>
+              <a:ext uri="{FF2B5EF4-FFF2-40B4-BE49-F238E27FC236}">
+                <a16:creationId xmlns:a16="http://schemas.microsoft.com/office/drawing/2014/main" id="{835229D3-A9C0-C44B-BD19-96DD5A7E6CF2}"/>
+              </a:ext>
+            </a:extLst>
+          </p:cNvPr>
+          <p:cNvSpPr txBox="1"/>
+          <p:nvPr/>
+        </p:nvSpPr>
+        <p:spPr>
+          <a:xfrm>
+            <a:off x="2123557" y="3203130"/>
+            <a:ext cx="4519614" cy="2900794"/>
+          </a:xfrm>
+          <a:prstGeom prst="rect">
+            <a:avLst/>
+          </a:prstGeom>
+          <a:noFill/>
+        </p:spPr>
+        <p:txBody>
+          <a:bodyPr wrap="square" lIns="0" tIns="0" rIns="0" bIns="0" rtlCol="0">
+            <a:spAutoFit/>
+          </a:bodyPr>
+          <a:lstStyle/>
+          <a:p>
+            <a:pPr algn="l"/>
+            <a:r>
+              <a:rPr lang="en-US" b="1" dirty="0">
+                <a:latin typeface="Sage Text" panose="02010503040201060103" pitchFamily="2" charset="77"/>
+              </a:rPr>
+              <a:t>Visual Studio 2022 for Development</a:t>
+            </a:r>
+          </a:p>
+          <a:p>
+            <a:pPr algn="l"/>
+            <a:endParaRPr lang="en-US" sz="1050" b="1" i="0" dirty="0">
+              <a:solidFill>
+                <a:schemeClr val="tx1"/>
+              </a:solidFill>
+              <a:latin typeface="Sage Text" panose="02010503040201060103" pitchFamily="2" charset="77"/>
+            </a:endParaRPr>
+          </a:p>
+          <a:p>
+            <a:pPr algn="l"/>
+            <a:r>
+              <a:rPr lang="en-US" sz="1600" dirty="0">
+                <a:latin typeface="Sage Text" panose="02010503040201060103" pitchFamily="2" charset="77"/>
+              </a:rPr>
+              <a:t>The Sage 300 Web SDK Wizards are compatible with Visual Studio 2019. With the recent release of Visual Studio 2022, the desire is to have these wizards be compatible with 2022.</a:t>
+            </a:r>
+          </a:p>
+          <a:p>
+            <a:pPr algn="l"/>
+            <a:r>
+              <a:rPr lang="en-US" sz="1600" dirty="0">
+                <a:latin typeface="Sage Text" panose="02010503040201060103" pitchFamily="2" charset="77"/>
+              </a:rPr>
+              <a:t>Note: This was attempted for the recent release of Sage 300 2023; however, with the new Visual Studio 2022 format, the 2019 wizards are not compatible with 2022 and this could not be overcome for 2023. Work with Microsoft is on-going.</a:t>
+            </a:r>
+            <a:endParaRPr lang="en-US" sz="1050" b="0" i="0" dirty="0">
+              <a:solidFill>
+                <a:schemeClr val="tx1"/>
+              </a:solidFill>
+              <a:latin typeface="Sage Text" panose="02010503040201060103" pitchFamily="2" charset="77"/>
+            </a:endParaRPr>
+          </a:p>
+        </p:txBody>
+      </p:sp>
+    </p:spTree>
+    <p:extLst>
+      <p:ext uri="{BB962C8B-B14F-4D97-AF65-F5344CB8AC3E}">
+        <p14:creationId xmlns:p14="http://schemas.microsoft.com/office/powerpoint/2010/main" val="3790535835"/>
+      </p:ext>
+    </p:extLst>
+  </p:cSld>
+  <p:clrMapOvr>
+    <a:masterClrMapping/>
+  </p:clrMapOvr>
+</p:sld>
+</file>
+
+<file path=ppt/slides/slide24.xml><?xml version="1.0" encoding="utf-8"?>
+<p:sld xmlns:a="http://schemas.openxmlformats.org/drawingml/2006/main" xmlns:r="http://schemas.openxmlformats.org/officeDocument/2006/relationships" xmlns:p="http://schemas.openxmlformats.org/presentationml/2006/main">
+  <p:cSld>
+    <p:spTree>
+      <p:nvGrpSpPr>
+        <p:cNvPr id="1" name=""/>
+        <p:cNvGrpSpPr/>
+        <p:nvPr/>
+      </p:nvGrpSpPr>
+      <p:grpSpPr>
+        <a:xfrm>
+          <a:off x="0" y="0"/>
+          <a:ext cx="0" cy="0"/>
+          <a:chOff x="0" y="0"/>
+          <a:chExt cx="0" cy="0"/>
+        </a:xfrm>
+      </p:grpSpPr>
+      <p:sp>
+        <p:nvSpPr>
+          <p:cNvPr id="4" name="Title 3">
+            <a:extLst>
+              <a:ext uri="{FF2B5EF4-FFF2-40B4-BE49-F238E27FC236}">
+                <a16:creationId xmlns:a16="http://schemas.microsoft.com/office/drawing/2014/main" id="{AA89E543-146D-294F-9FD3-AF6A4DE2627F}"/>
+              </a:ext>
+            </a:extLst>
+          </p:cNvPr>
+          <p:cNvSpPr>
+            <a:spLocks noGrp="1"/>
+          </p:cNvSpPr>
+          <p:nvPr>
+            <p:ph type="title"/>
+          </p:nvPr>
+        </p:nvSpPr>
+        <p:spPr/>
+        <p:txBody>
+          <a:bodyPr/>
+          <a:lstStyle/>
+          <a:p>
+            <a:r>
+              <a:rPr lang="en-US" dirty="0"/>
+              <a:t>Upcoming Items</a:t>
+            </a:r>
+          </a:p>
+        </p:txBody>
+      </p:sp>
+      <p:sp>
+        <p:nvSpPr>
+          <p:cNvPr id="3" name="Slide Number Placeholder 2">
+            <a:extLst>
+              <a:ext uri="{FF2B5EF4-FFF2-40B4-BE49-F238E27FC236}">
+                <a16:creationId xmlns:a16="http://schemas.microsoft.com/office/drawing/2014/main" id="{5302E8D6-A2CE-524D-9C82-E2B74B4B7151}"/>
+              </a:ext>
+            </a:extLst>
+          </p:cNvPr>
+          <p:cNvSpPr>
+            <a:spLocks noGrp="1"/>
+          </p:cNvSpPr>
+          <p:nvPr>
+            <p:ph type="sldNum" sz="quarter" idx="10"/>
+          </p:nvPr>
+        </p:nvSpPr>
+        <p:spPr/>
+        <p:txBody>
+          <a:bodyPr/>
+          <a:lstStyle/>
+          <a:p>
+            <a:r>
+              <a:rPr lang="en-US"/>
+              <a:t>Page </a:t>
+            </a:r>
+            <a:fld id="{888928BD-9DD5-4B49-B597-3FD2BD4272DD}" type="slidenum">
+              <a:rPr smtClean="0"/>
+              <a:pPr/>
+              <a:t>24</a:t>
+            </a:fld>
+            <a:endParaRPr dirty="0"/>
+          </a:p>
+        </p:txBody>
+      </p:sp>
+      <p:sp>
+        <p:nvSpPr>
+          <p:cNvPr id="5" name="Text Placeholder 4">
+            <a:extLst>
+              <a:ext uri="{FF2B5EF4-FFF2-40B4-BE49-F238E27FC236}">
+                <a16:creationId xmlns:a16="http://schemas.microsoft.com/office/drawing/2014/main" id="{E550BF31-3F58-5545-8936-5F365D1642EF}"/>
+              </a:ext>
+            </a:extLst>
+          </p:cNvPr>
+          <p:cNvSpPr>
+            <a:spLocks noGrp="1"/>
+          </p:cNvSpPr>
+          <p:nvPr>
+            <p:ph type="body" sz="quarter" idx="13"/>
+          </p:nvPr>
+        </p:nvSpPr>
+        <p:spPr>
+          <a:xfrm>
+            <a:off x="6254750" y="499867"/>
+            <a:ext cx="3627380" cy="1214633"/>
+          </a:xfrm>
+        </p:spPr>
+        <p:txBody>
+          <a:bodyPr/>
+          <a:lstStyle/>
+          <a:p>
+            <a:r>
+              <a:rPr lang="en-US" dirty="0"/>
+              <a:t>Planned Web API and SDK work</a:t>
+            </a:r>
+          </a:p>
+          <a:p>
+            <a:pPr algn="r"/>
+            <a:r>
+              <a:rPr lang="en-US" sz="1400" i="1" dirty="0"/>
+              <a:t>Subject to change</a:t>
+            </a:r>
+          </a:p>
+        </p:txBody>
+      </p:sp>
+      <p:cxnSp>
+        <p:nvCxnSpPr>
+          <p:cNvPr id="10" name="Straight Connector 9">
+            <a:extLst>
+              <a:ext uri="{FF2B5EF4-FFF2-40B4-BE49-F238E27FC236}">
+                <a16:creationId xmlns:a16="http://schemas.microsoft.com/office/drawing/2014/main" id="{42AB05C6-89B8-8845-86D2-7CD97525066D}"/>
+              </a:ext>
+            </a:extLst>
+          </p:cNvPr>
+          <p:cNvCxnSpPr>
+            <a:cxnSpLocks/>
+          </p:cNvCxnSpPr>
+          <p:nvPr/>
+        </p:nvCxnSpPr>
+        <p:spPr>
+          <a:xfrm>
+            <a:off x="1605731" y="2709422"/>
+            <a:ext cx="0" cy="2603243"/>
+          </a:xfrm>
+          <a:prstGeom prst="line">
+            <a:avLst/>
+          </a:prstGeom>
+          <a:ln w="12700">
+            <a:solidFill>
+              <a:schemeClr val="tx1"/>
+            </a:solidFill>
+          </a:ln>
+          <a:effectLst/>
+        </p:spPr>
+        <p:style>
+          <a:lnRef idx="2">
+            <a:schemeClr val="accent1"/>
+          </a:lnRef>
+          <a:fillRef idx="0">
+            <a:schemeClr val="accent1"/>
+          </a:fillRef>
+          <a:effectRef idx="1">
+            <a:schemeClr val="accent1"/>
+          </a:effectRef>
+          <a:fontRef idx="minor">
+            <a:schemeClr val="tx1"/>
+          </a:fontRef>
+        </p:style>
+      </p:cxnSp>
+      <p:sp>
+        <p:nvSpPr>
+          <p:cNvPr id="13" name="Oval 12">
+            <a:extLst>
+              <a:ext uri="{FF2B5EF4-FFF2-40B4-BE49-F238E27FC236}">
+                <a16:creationId xmlns:a16="http://schemas.microsoft.com/office/drawing/2014/main" id="{0DFCFC4B-EE23-1643-92FE-9B6C48CABAF6}"/>
+              </a:ext>
+            </a:extLst>
+          </p:cNvPr>
+          <p:cNvSpPr>
+            <a:spLocks noChangeAspect="1"/>
+          </p:cNvSpPr>
+          <p:nvPr/>
+        </p:nvSpPr>
+        <p:spPr>
+          <a:xfrm>
+            <a:off x="1462714" y="2557024"/>
+            <a:ext cx="274320" cy="274320"/>
+          </a:xfrm>
+          <a:prstGeom prst="ellipse">
+            <a:avLst/>
+          </a:prstGeom>
+          <a:solidFill>
+            <a:schemeClr val="tx2"/>
+          </a:solidFill>
+          <a:ln>
+            <a:noFill/>
+          </a:ln>
+          <a:effectLst/>
+        </p:spPr>
+        <p:style>
+          <a:lnRef idx="1">
+            <a:schemeClr val="accent1"/>
+          </a:lnRef>
+          <a:fillRef idx="3">
+            <a:schemeClr val="accent1"/>
+          </a:fillRef>
+          <a:effectRef idx="2">
+            <a:schemeClr val="accent1"/>
+          </a:effectRef>
+          <a:fontRef idx="minor">
+            <a:schemeClr val="lt1"/>
+          </a:fontRef>
+        </p:style>
+        <p:txBody>
+          <a:bodyPr wrap="none" lIns="0" tIns="0" rIns="0" bIns="0" rtlCol="0" anchor="ctr"/>
+          <a:lstStyle/>
+          <a:p>
+            <a:pPr algn="ctr"/>
+            <a:endParaRPr lang="en-US" sz="1100" b="1" i="0" dirty="0">
+              <a:solidFill>
+                <a:schemeClr val="bg1"/>
+              </a:solidFill>
+              <a:latin typeface="Sage Text" panose="02010503040201060103" pitchFamily="2" charset="77"/>
+            </a:endParaRPr>
+          </a:p>
+        </p:txBody>
+      </p:sp>
+      <p:sp>
+        <p:nvSpPr>
+          <p:cNvPr id="15" name="Rounded Rectangle 14">
+            <a:extLst>
+              <a:ext uri="{FF2B5EF4-FFF2-40B4-BE49-F238E27FC236}">
+                <a16:creationId xmlns:a16="http://schemas.microsoft.com/office/drawing/2014/main" id="{BC368AC4-E14F-9F4E-97AF-7748F90BA63E}"/>
+              </a:ext>
+            </a:extLst>
+          </p:cNvPr>
+          <p:cNvSpPr/>
+          <p:nvPr/>
+        </p:nvSpPr>
+        <p:spPr>
+          <a:xfrm>
+            <a:off x="1881186" y="2557024"/>
+            <a:ext cx="4761985" cy="274320"/>
+          </a:xfrm>
+          <a:prstGeom prst="roundRect">
+            <a:avLst>
+              <a:gd name="adj" fmla="val 50000"/>
+            </a:avLst>
+          </a:prstGeom>
+          <a:solidFill>
+            <a:schemeClr val="tx2"/>
+          </a:solidFill>
+          <a:ln>
+            <a:noFill/>
+          </a:ln>
+          <a:effectLst/>
+        </p:spPr>
+        <p:style>
+          <a:lnRef idx="1">
+            <a:schemeClr val="accent1"/>
+          </a:lnRef>
+          <a:fillRef idx="3">
+            <a:schemeClr val="accent1"/>
+          </a:fillRef>
+          <a:effectRef idx="2">
+            <a:schemeClr val="accent1"/>
+          </a:effectRef>
+          <a:fontRef idx="minor">
+            <a:schemeClr val="lt1"/>
+          </a:fontRef>
+        </p:style>
+        <p:txBody>
+          <a:bodyPr rtlCol="0" anchor="ctr"/>
+          <a:lstStyle/>
+          <a:p>
+            <a:pPr algn="ctr"/>
+            <a:r>
+              <a:rPr lang="en-US" sz="2000" b="1" i="0" dirty="0">
+                <a:solidFill>
+                  <a:schemeClr val="bg1"/>
+                </a:solidFill>
+                <a:latin typeface="Sage Text" panose="02010503040201060103" pitchFamily="2" charset="77"/>
+              </a:rPr>
+              <a:t>Target – 2024.2</a:t>
             </a:r>
           </a:p>
         </p:txBody>
@@ -17211,7 +17766,7 @@
 </p:sld>
 </file>
 
-<file path=ppt/slides/slide24.xml><?xml version="1.0" encoding="utf-8"?>
+<file path=ppt/slides/slide25.xml><?xml version="1.0" encoding="utf-8"?>
 <p:sld xmlns:a="http://schemas.openxmlformats.org/drawingml/2006/main" xmlns:r="http://schemas.openxmlformats.org/officeDocument/2006/relationships" xmlns:p="http://schemas.openxmlformats.org/presentationml/2006/main">
   <p:cSld>
     <p:spTree>
@@ -17284,7 +17839,7 @@
             <a:fld id="{888928BD-9DD5-4B49-B597-3FD2BD4272DD}" type="slidenum">
               <a:rPr smtClean="0"/>
               <a:pPr/>
-              <a:t>24</a:t>
+              <a:t>25</a:t>
             </a:fld>
             <a:endParaRPr dirty="0"/>
           </a:p>
@@ -17488,7 +18043,7 @@
                 </a:solidFill>
                 <a:latin typeface="Sage Text" panose="02010503040201060103" pitchFamily="2" charset="77"/>
               </a:rPr>
-              <a:t>Target – 2024.0</a:t>
+              <a:t>Target – 2024.2</a:t>
             </a:r>
           </a:p>
         </p:txBody>
@@ -18925,7 +19480,7 @@
 </p:sld>
 </file>
 
-<file path=ppt/slides/slide25.xml><?xml version="1.0" encoding="utf-8"?>
+<file path=ppt/slides/slide26.xml><?xml version="1.0" encoding="utf-8"?>
 <p:sld xmlns:a="http://schemas.openxmlformats.org/drawingml/2006/main" xmlns:r="http://schemas.openxmlformats.org/officeDocument/2006/relationships" xmlns:p="http://schemas.openxmlformats.org/presentationml/2006/main">
   <p:cSld>
     <p:spTree>
@@ -18998,7 +19553,7 @@
             <a:fld id="{888928BD-9DD5-4B49-B597-3FD2BD4272DD}" type="slidenum">
               <a:rPr smtClean="0"/>
               <a:pPr/>
-              <a:t>25</a:t>
+              <a:t>26</a:t>
             </a:fld>
             <a:endParaRPr dirty="0"/>
           </a:p>
@@ -19202,8 +19757,23 @@
                 </a:solidFill>
                 <a:latin typeface="Sage Text" panose="02010503040201060103" pitchFamily="2" charset="77"/>
               </a:rPr>
-              <a:t>Target – 2024.0</a:t>
-            </a:r>
+              <a:t>Target – 2025.</a:t>
+            </a:r>
+            <a:r>
+              <a:rPr lang="en-US" sz="2000" b="1" dirty="0">
+                <a:solidFill>
+                  <a:schemeClr val="bg1"/>
+                </a:solidFill>
+                <a:latin typeface="Sage Text" panose="02010503040201060103" pitchFamily="2" charset="77"/>
+              </a:rPr>
+              <a:t>x</a:t>
+            </a:r>
+            <a:endParaRPr lang="en-US" sz="2000" b="1" i="0" dirty="0">
+              <a:solidFill>
+                <a:schemeClr val="bg1"/>
+              </a:solidFill>
+              <a:latin typeface="Sage Text" panose="02010503040201060103" pitchFamily="2" charset="77"/>
+            </a:endParaRPr>
           </a:p>
         </p:txBody>
       </p:sp>
@@ -19300,7 +19870,7 @@
 </p:sld>
 </file>
 
-<file path=ppt/slides/slide26.xml><?xml version="1.0" encoding="utf-8"?>
+<file path=ppt/slides/slide27.xml><?xml version="1.0" encoding="utf-8"?>
 <p:sld xmlns:a="http://schemas.openxmlformats.org/drawingml/2006/main" xmlns:r="http://schemas.openxmlformats.org/officeDocument/2006/relationships" xmlns:p="http://schemas.openxmlformats.org/presentationml/2006/main">
   <p:cSld>
     <p:spTree>
@@ -19373,7 +19943,7 @@
             <a:fld id="{888928BD-9DD5-4B49-B597-3FD2BD4272DD}" type="slidenum">
               <a:rPr smtClean="0"/>
               <a:pPr/>
-              <a:t>26</a:t>
+              <a:t>27</a:t>
             </a:fld>
             <a:endParaRPr dirty="0"/>
           </a:p>
@@ -19577,7 +20147,7 @@
                 </a:solidFill>
                 <a:latin typeface="Sage Text" panose="02010503040201060103" pitchFamily="2" charset="77"/>
               </a:rPr>
-              <a:t>Target – 2024.x</a:t>
+              <a:t>Target – 2025.x</a:t>
             </a:r>
           </a:p>
         </p:txBody>
@@ -19597,7 +20167,7 @@
         <p:spPr>
           <a:xfrm>
             <a:off x="2123557" y="3203130"/>
-            <a:ext cx="4519614" cy="2162130"/>
+            <a:ext cx="4519614" cy="1423467"/>
           </a:xfrm>
           <a:prstGeom prst="rect">
             <a:avLst/>
@@ -19615,7 +20185,7 @@
               <a:rPr lang="en-US" b="1" dirty="0">
                 <a:latin typeface="Sage Text" panose="02010503040201060103" pitchFamily="2" charset="77"/>
               </a:rPr>
-              <a:t>Subclassing</a:t>
+              <a:t>AOM to be included in Web SDK</a:t>
             </a:r>
           </a:p>
           <a:p>
@@ -19633,7 +20203,7 @@
               <a:rPr lang="en-US" sz="1600" dirty="0">
                 <a:latin typeface="Sage Text" panose="02010503040201060103" pitchFamily="2" charset="77"/>
               </a:rPr>
-              <a:t>Currently Sage 300 web screens cannot surface any subclassed fields in the underlying business view.</a:t>
+              <a:t>Currently AOM is delivered via DPP.</a:t>
             </a:r>
           </a:p>
           <a:p>
@@ -19651,7 +20221,7 @@
               <a:rPr lang="en-US" sz="1600" dirty="0">
                 <a:latin typeface="Sage Text" panose="02010503040201060103" pitchFamily="2" charset="77"/>
               </a:rPr>
-              <a:t>is to be able to access any subclassed fields for the customization strategy to interact with these fields for inclusion in the UI or for simply data access.</a:t>
+              <a:t>is to deliver the AOM in the Web SDK and make the source code and project available for partners to generate an AOM for their views.</a:t>
             </a:r>
             <a:endParaRPr lang="en-US" sz="1050" b="0" i="0" dirty="0">
               <a:solidFill>
@@ -19662,40 +20232,10 @@
           </a:p>
         </p:txBody>
       </p:sp>
-      <p:pic>
-        <p:nvPicPr>
-          <p:cNvPr id="2" name="Picture 1">
-            <a:extLst>
-              <a:ext uri="{FF2B5EF4-FFF2-40B4-BE49-F238E27FC236}">
-                <a16:creationId xmlns:a16="http://schemas.microsoft.com/office/drawing/2014/main" id="{C7354074-AE4E-777E-27FF-DF17709254AF}"/>
-              </a:ext>
-            </a:extLst>
-          </p:cNvPr>
-          <p:cNvPicPr>
-            <a:picLocks noChangeAspect="1"/>
-          </p:cNvPicPr>
-          <p:nvPr/>
-        </p:nvPicPr>
-        <p:blipFill>
-          <a:blip r:embed="rId2"/>
-          <a:stretch>
-            <a:fillRect/>
-          </a:stretch>
-        </p:blipFill>
-        <p:spPr>
-          <a:xfrm>
-            <a:off x="8333931" y="1714500"/>
-            <a:ext cx="3096397" cy="4004821"/>
-          </a:xfrm>
-          <a:prstGeom prst="rect">
-            <a:avLst/>
-          </a:prstGeom>
-        </p:spPr>
-      </p:pic>
     </p:spTree>
     <p:extLst>
       <p:ext uri="{BB962C8B-B14F-4D97-AF65-F5344CB8AC3E}">
-        <p14:creationId xmlns:p14="http://schemas.microsoft.com/office/powerpoint/2010/main" val="1947034273"/>
+        <p14:creationId xmlns:p14="http://schemas.microsoft.com/office/powerpoint/2010/main" val="2485485443"/>
       </p:ext>
     </p:extLst>
   </p:cSld>
@@ -19705,7 +20245,7 @@
 </p:sld>
 </file>
 
-<file path=ppt/slides/slide27.xml><?xml version="1.0" encoding="utf-8"?>
+<file path=ppt/slides/slide28.xml><?xml version="1.0" encoding="utf-8"?>
 <p:sld xmlns:a="http://schemas.openxmlformats.org/drawingml/2006/main" xmlns:r="http://schemas.openxmlformats.org/officeDocument/2006/relationships" xmlns:p="http://schemas.openxmlformats.org/presentationml/2006/main">
   <p:cSld>
     <p:spTree>
@@ -19778,7 +20318,7 @@
             <a:fld id="{888928BD-9DD5-4B49-B597-3FD2BD4272DD}" type="slidenum">
               <a:rPr smtClean="0"/>
               <a:pPr/>
-              <a:t>27</a:t>
+              <a:t>28</a:t>
             </a:fld>
             <a:endParaRPr dirty="0"/>
           </a:p>
@@ -19982,382 +20522,7 @@
                 </a:solidFill>
                 <a:latin typeface="Sage Text" panose="02010503040201060103" pitchFamily="2" charset="77"/>
               </a:rPr>
-              <a:t>Target – 2024.x</a:t>
-            </a:r>
-          </a:p>
-        </p:txBody>
-      </p:sp>
-      <p:sp>
-        <p:nvSpPr>
-          <p:cNvPr id="25" name="TextBox 24">
-            <a:extLst>
-              <a:ext uri="{FF2B5EF4-FFF2-40B4-BE49-F238E27FC236}">
-                <a16:creationId xmlns:a16="http://schemas.microsoft.com/office/drawing/2014/main" id="{835229D3-A9C0-C44B-BD19-96DD5A7E6CF2}"/>
-              </a:ext>
-            </a:extLst>
-          </p:cNvPr>
-          <p:cNvSpPr txBox="1"/>
-          <p:nvPr/>
-        </p:nvSpPr>
-        <p:spPr>
-          <a:xfrm>
-            <a:off x="2123557" y="3203130"/>
-            <a:ext cx="4519614" cy="1423467"/>
-          </a:xfrm>
-          <a:prstGeom prst="rect">
-            <a:avLst/>
-          </a:prstGeom>
-          <a:noFill/>
-        </p:spPr>
-        <p:txBody>
-          <a:bodyPr wrap="square" lIns="0" tIns="0" rIns="0" bIns="0" rtlCol="0">
-            <a:spAutoFit/>
-          </a:bodyPr>
-          <a:lstStyle/>
-          <a:p>
-            <a:pPr algn="l"/>
-            <a:r>
-              <a:rPr lang="en-US" b="1" dirty="0">
-                <a:latin typeface="Sage Text" panose="02010503040201060103" pitchFamily="2" charset="77"/>
-              </a:rPr>
-              <a:t>AOM to be included in Web SDK</a:t>
-            </a:r>
-          </a:p>
-          <a:p>
-            <a:pPr algn="l"/>
-            <a:endParaRPr lang="en-US" sz="1050" b="1" i="0" dirty="0">
-              <a:solidFill>
-                <a:schemeClr val="tx1"/>
-              </a:solidFill>
-              <a:latin typeface="Sage Text" panose="02010503040201060103" pitchFamily="2" charset="77"/>
-            </a:endParaRPr>
-          </a:p>
-          <a:p>
-            <a:pPr algn="l"/>
-            <a:r>
-              <a:rPr lang="en-US" sz="1600" dirty="0">
-                <a:latin typeface="Sage Text" panose="02010503040201060103" pitchFamily="2" charset="77"/>
-              </a:rPr>
-              <a:t>Currently AOM is delivered via DPP.</a:t>
-            </a:r>
-          </a:p>
-          <a:p>
-            <a:pPr algn="l"/>
-            <a:r>
-              <a:rPr lang="en-US" sz="1600" b="0" i="0" dirty="0">
-                <a:solidFill>
-                  <a:schemeClr val="tx1"/>
-                </a:solidFill>
-                <a:latin typeface="Sage Text" panose="02010503040201060103" pitchFamily="2" charset="77"/>
-              </a:rPr>
-              <a:t>The desire </a:t>
-            </a:r>
-            <a:r>
-              <a:rPr lang="en-US" sz="1600" dirty="0">
-                <a:latin typeface="Sage Text" panose="02010503040201060103" pitchFamily="2" charset="77"/>
-              </a:rPr>
-              <a:t>is to deliver the AOM in the Web SDK and make the source code and project available for partners to generate an AOM for their views.</a:t>
-            </a:r>
-            <a:endParaRPr lang="en-US" sz="1050" b="0" i="0" dirty="0">
-              <a:solidFill>
-                <a:schemeClr val="tx1"/>
-              </a:solidFill>
-              <a:latin typeface="Sage Text" panose="02010503040201060103" pitchFamily="2" charset="77"/>
-            </a:endParaRPr>
-          </a:p>
-        </p:txBody>
-      </p:sp>
-    </p:spTree>
-    <p:extLst>
-      <p:ext uri="{BB962C8B-B14F-4D97-AF65-F5344CB8AC3E}">
-        <p14:creationId xmlns:p14="http://schemas.microsoft.com/office/powerpoint/2010/main" val="2485485443"/>
-      </p:ext>
-    </p:extLst>
-  </p:cSld>
-  <p:clrMapOvr>
-    <a:masterClrMapping/>
-  </p:clrMapOvr>
-</p:sld>
-</file>
-
-<file path=ppt/slides/slide28.xml><?xml version="1.0" encoding="utf-8"?>
-<p:sld xmlns:a="http://schemas.openxmlformats.org/drawingml/2006/main" xmlns:r="http://schemas.openxmlformats.org/officeDocument/2006/relationships" xmlns:p="http://schemas.openxmlformats.org/presentationml/2006/main">
-  <p:cSld>
-    <p:spTree>
-      <p:nvGrpSpPr>
-        <p:cNvPr id="1" name=""/>
-        <p:cNvGrpSpPr/>
-        <p:nvPr/>
-      </p:nvGrpSpPr>
-      <p:grpSpPr>
-        <a:xfrm>
-          <a:off x="0" y="0"/>
-          <a:ext cx="0" cy="0"/>
-          <a:chOff x="0" y="0"/>
-          <a:chExt cx="0" cy="0"/>
-        </a:xfrm>
-      </p:grpSpPr>
-      <p:sp>
-        <p:nvSpPr>
-          <p:cNvPr id="4" name="Title 3">
-            <a:extLst>
-              <a:ext uri="{FF2B5EF4-FFF2-40B4-BE49-F238E27FC236}">
-                <a16:creationId xmlns:a16="http://schemas.microsoft.com/office/drawing/2014/main" id="{AA89E543-146D-294F-9FD3-AF6A4DE2627F}"/>
-              </a:ext>
-            </a:extLst>
-          </p:cNvPr>
-          <p:cNvSpPr>
-            <a:spLocks noGrp="1"/>
-          </p:cNvSpPr>
-          <p:nvPr>
-            <p:ph type="title"/>
-          </p:nvPr>
-        </p:nvSpPr>
-        <p:spPr/>
-        <p:txBody>
-          <a:bodyPr/>
-          <a:lstStyle/>
-          <a:p>
-            <a:r>
-              <a:rPr lang="en-US" dirty="0"/>
-              <a:t>Upcoming Items</a:t>
-            </a:r>
-          </a:p>
-        </p:txBody>
-      </p:sp>
-      <p:sp>
-        <p:nvSpPr>
-          <p:cNvPr id="3" name="Slide Number Placeholder 2">
-            <a:extLst>
-              <a:ext uri="{FF2B5EF4-FFF2-40B4-BE49-F238E27FC236}">
-                <a16:creationId xmlns:a16="http://schemas.microsoft.com/office/drawing/2014/main" id="{5302E8D6-A2CE-524D-9C82-E2B74B4B7151}"/>
-              </a:ext>
-            </a:extLst>
-          </p:cNvPr>
-          <p:cNvSpPr>
-            <a:spLocks noGrp="1"/>
-          </p:cNvSpPr>
-          <p:nvPr>
-            <p:ph type="sldNum" sz="quarter" idx="10"/>
-          </p:nvPr>
-        </p:nvSpPr>
-        <p:spPr/>
-        <p:txBody>
-          <a:bodyPr/>
-          <a:lstStyle/>
-          <a:p>
-            <a:r>
-              <a:rPr lang="en-US"/>
-              <a:t>Page </a:t>
-            </a:r>
-            <a:fld id="{888928BD-9DD5-4B49-B597-3FD2BD4272DD}" type="slidenum">
-              <a:rPr smtClean="0"/>
-              <a:pPr/>
-              <a:t>28</a:t>
-            </a:fld>
-            <a:endParaRPr dirty="0"/>
-          </a:p>
-        </p:txBody>
-      </p:sp>
-      <p:sp>
-        <p:nvSpPr>
-          <p:cNvPr id="5" name="Text Placeholder 4">
-            <a:extLst>
-              <a:ext uri="{FF2B5EF4-FFF2-40B4-BE49-F238E27FC236}">
-                <a16:creationId xmlns:a16="http://schemas.microsoft.com/office/drawing/2014/main" id="{E550BF31-3F58-5545-8936-5F365D1642EF}"/>
-              </a:ext>
-            </a:extLst>
-          </p:cNvPr>
-          <p:cNvSpPr>
-            <a:spLocks noGrp="1"/>
-          </p:cNvSpPr>
-          <p:nvPr>
-            <p:ph type="body" sz="quarter" idx="13"/>
-          </p:nvPr>
-        </p:nvSpPr>
-        <p:spPr>
-          <a:xfrm>
-            <a:off x="6254750" y="499867"/>
-            <a:ext cx="3627380" cy="1214633"/>
-          </a:xfrm>
-        </p:spPr>
-        <p:txBody>
-          <a:bodyPr/>
-          <a:lstStyle/>
-          <a:p>
-            <a:r>
-              <a:rPr lang="en-US" dirty="0"/>
-              <a:t>Planned Web API and SDK work</a:t>
-            </a:r>
-          </a:p>
-          <a:p>
-            <a:pPr algn="r"/>
-            <a:r>
-              <a:rPr lang="en-US" sz="1400" i="1" dirty="0"/>
-              <a:t>Subject to change</a:t>
-            </a:r>
-          </a:p>
-        </p:txBody>
-      </p:sp>
-      <p:cxnSp>
-        <p:nvCxnSpPr>
-          <p:cNvPr id="10" name="Straight Connector 9">
-            <a:extLst>
-              <a:ext uri="{FF2B5EF4-FFF2-40B4-BE49-F238E27FC236}">
-                <a16:creationId xmlns:a16="http://schemas.microsoft.com/office/drawing/2014/main" id="{42AB05C6-89B8-8845-86D2-7CD97525066D}"/>
-              </a:ext>
-            </a:extLst>
-          </p:cNvPr>
-          <p:cNvCxnSpPr>
-            <a:cxnSpLocks/>
-          </p:cNvCxnSpPr>
-          <p:nvPr/>
-        </p:nvCxnSpPr>
-        <p:spPr>
-          <a:xfrm>
-            <a:off x="1605731" y="2709422"/>
-            <a:ext cx="0" cy="2603243"/>
-          </a:xfrm>
-          <a:prstGeom prst="line">
-            <a:avLst/>
-          </a:prstGeom>
-          <a:ln w="12700">
-            <a:solidFill>
-              <a:schemeClr val="tx1"/>
-            </a:solidFill>
-          </a:ln>
-          <a:effectLst/>
-        </p:spPr>
-        <p:style>
-          <a:lnRef idx="2">
-            <a:schemeClr val="accent1"/>
-          </a:lnRef>
-          <a:fillRef idx="0">
-            <a:schemeClr val="accent1"/>
-          </a:fillRef>
-          <a:effectRef idx="1">
-            <a:schemeClr val="accent1"/>
-          </a:effectRef>
-          <a:fontRef idx="minor">
-            <a:schemeClr val="tx1"/>
-          </a:fontRef>
-        </p:style>
-      </p:cxnSp>
-      <p:sp>
-        <p:nvSpPr>
-          <p:cNvPr id="13" name="Oval 12">
-            <a:extLst>
-              <a:ext uri="{FF2B5EF4-FFF2-40B4-BE49-F238E27FC236}">
-                <a16:creationId xmlns:a16="http://schemas.microsoft.com/office/drawing/2014/main" id="{0DFCFC4B-EE23-1643-92FE-9B6C48CABAF6}"/>
-              </a:ext>
-            </a:extLst>
-          </p:cNvPr>
-          <p:cNvSpPr>
-            <a:spLocks noChangeAspect="1"/>
-          </p:cNvSpPr>
-          <p:nvPr/>
-        </p:nvSpPr>
-        <p:spPr>
-          <a:xfrm>
-            <a:off x="1462714" y="2557024"/>
-            <a:ext cx="274320" cy="274320"/>
-          </a:xfrm>
-          <a:prstGeom prst="ellipse">
-            <a:avLst/>
-          </a:prstGeom>
-          <a:solidFill>
-            <a:schemeClr val="tx2"/>
-          </a:solidFill>
-          <a:ln>
-            <a:noFill/>
-          </a:ln>
-          <a:effectLst/>
-        </p:spPr>
-        <p:style>
-          <a:lnRef idx="1">
-            <a:schemeClr val="accent1"/>
-          </a:lnRef>
-          <a:fillRef idx="3">
-            <a:schemeClr val="accent1"/>
-          </a:fillRef>
-          <a:effectRef idx="2">
-            <a:schemeClr val="accent1"/>
-          </a:effectRef>
-          <a:fontRef idx="minor">
-            <a:schemeClr val="lt1"/>
-          </a:fontRef>
-        </p:style>
-        <p:txBody>
-          <a:bodyPr wrap="none" lIns="0" tIns="0" rIns="0" bIns="0" rtlCol="0" anchor="ctr"/>
-          <a:lstStyle/>
-          <a:p>
-            <a:pPr algn="ctr"/>
-            <a:endParaRPr lang="en-US" sz="1100" b="1" i="0" dirty="0">
-              <a:solidFill>
-                <a:schemeClr val="bg1"/>
-              </a:solidFill>
-              <a:latin typeface="Sage Text" panose="02010503040201060103" pitchFamily="2" charset="77"/>
-            </a:endParaRPr>
-          </a:p>
-        </p:txBody>
-      </p:sp>
-      <p:sp>
-        <p:nvSpPr>
-          <p:cNvPr id="15" name="Rounded Rectangle 14">
-            <a:extLst>
-              <a:ext uri="{FF2B5EF4-FFF2-40B4-BE49-F238E27FC236}">
-                <a16:creationId xmlns:a16="http://schemas.microsoft.com/office/drawing/2014/main" id="{BC368AC4-E14F-9F4E-97AF-7748F90BA63E}"/>
-              </a:ext>
-            </a:extLst>
-          </p:cNvPr>
-          <p:cNvSpPr/>
-          <p:nvPr/>
-        </p:nvSpPr>
-        <p:spPr>
-          <a:xfrm>
-            <a:off x="1881186" y="2557024"/>
-            <a:ext cx="4761985" cy="274320"/>
-          </a:xfrm>
-          <a:prstGeom prst="roundRect">
-            <a:avLst>
-              <a:gd name="adj" fmla="val 50000"/>
-            </a:avLst>
-          </a:prstGeom>
-          <a:solidFill>
-            <a:schemeClr val="tx2"/>
-          </a:solidFill>
-          <a:ln>
-            <a:noFill/>
-          </a:ln>
-          <a:effectLst/>
-        </p:spPr>
-        <p:style>
-          <a:lnRef idx="1">
-            <a:schemeClr val="accent1"/>
-          </a:lnRef>
-          <a:fillRef idx="3">
-            <a:schemeClr val="accent1"/>
-          </a:fillRef>
-          <a:effectRef idx="2">
-            <a:schemeClr val="accent1"/>
-          </a:effectRef>
-          <a:fontRef idx="minor">
-            <a:schemeClr val="lt1"/>
-          </a:fontRef>
-        </p:style>
-        <p:txBody>
-          <a:bodyPr rtlCol="0" anchor="ctr"/>
-          <a:lstStyle/>
-          <a:p>
-            <a:pPr algn="ctr"/>
-            <a:r>
-              <a:rPr lang="en-US" sz="2000" b="1" i="0" dirty="0">
-                <a:solidFill>
-                  <a:schemeClr val="bg1"/>
-                </a:solidFill>
-                <a:latin typeface="Sage Text" panose="02010503040201060103" pitchFamily="2" charset="77"/>
-              </a:rPr>
-              <a:t>Target – 2024.x</a:t>
+              <a:t>Target – 2025.x</a:t>
             </a:r>
           </a:p>
         </p:txBody>
@@ -25026,7 +25191,7 @@
             </a:pPr>
             <a:r>
               <a:rPr lang="en-CA" sz="1600" dirty="0"/>
-              <a:t>Change coming in 2024.0 release</a:t>
+              <a:t>Implemented for 2024.2</a:t>
             </a:r>
           </a:p>
         </p:txBody>

</xml_diff>